<commit_message>
adding Peter Manolov Description
</commit_message>
<xml_diff>
--- a/0 Java Advanced .pptx
+++ b/0 Java Advanced .pptx
@@ -2,16 +2,16 @@
 <file path=ppt/presentation.xml><?xml version="1.0" encoding="utf-8"?>
 <p:presentation xmlns:a="http://schemas.openxmlformats.org/drawingml/2006/main" xmlns:r="http://schemas.openxmlformats.org/officeDocument/2006/relationships" xmlns:p="http://schemas.openxmlformats.org/presentationml/2006/main">
   <p:sldMasterIdLst>
-    <p:sldMasterId id="2147483648" r:id="rId5"/>
+    <p:sldMasterId id="2147483648" r:id="rId1"/>
   </p:sldMasterIdLst>
   <p:notesMasterIdLst>
-    <p:notesMasterId r:id="rId7"/>
+    <p:notesMasterId r:id="rId6"/>
   </p:notesMasterIdLst>
   <p:sldIdLst>
-    <p:sldId id="256" r:id="rId8"/>
-    <p:sldId id="257" r:id="rId9"/>
-    <p:sldId id="258" r:id="rId10"/>
-    <p:sldId id="259" r:id="rId11"/>
+    <p:sldId id="256" r:id="rId2"/>
+    <p:sldId id="260" r:id="rId3"/>
+    <p:sldId id="258" r:id="rId4"/>
+    <p:sldId id="259" r:id="rId5"/>
   </p:sldIdLst>
   <p:sldSz cx="13004800" cy="9753600"/>
   <p:notesSz cx="6858000" cy="9144000"/>
@@ -31,7 +31,7 @@
       <a:buFontTx/>
       <a:buNone/>
       <a:tabLst/>
-      <a:defRPr b="0" baseline="0" cap="none" i="0" spc="0" strike="noStrike" sz="1800" u="none" kumimoji="0" normalizeH="0">
+      <a:defRPr kumimoji="0" sz="1800" b="0" i="0" u="none" strike="noStrike" cap="none" spc="0" normalizeH="0" baseline="0">
         <a:ln>
           <a:noFill/>
         </a:ln>
@@ -57,7 +57,7 @@
       <a:buFontTx/>
       <a:buNone/>
       <a:tabLst/>
-      <a:defRPr b="0" baseline="0" cap="none" i="0" spc="0" strike="noStrike" sz="3600" u="none" kumimoji="0" normalizeH="0">
+      <a:defRPr kumimoji="0" sz="3600" b="0" i="0" u="none" strike="noStrike" cap="none" spc="0" normalizeH="0" baseline="0">
         <a:ln>
           <a:noFill/>
         </a:ln>
@@ -87,7 +87,7 @@
       <a:buFontTx/>
       <a:buNone/>
       <a:tabLst/>
-      <a:defRPr b="0" baseline="0" cap="none" i="0" spc="0" strike="noStrike" sz="3600" u="none" kumimoji="0" normalizeH="0">
+      <a:defRPr kumimoji="0" sz="3600" b="0" i="0" u="none" strike="noStrike" cap="none" spc="0" normalizeH="0" baseline="0">
         <a:ln>
           <a:noFill/>
         </a:ln>
@@ -117,7 +117,7 @@
       <a:buFontTx/>
       <a:buNone/>
       <a:tabLst/>
-      <a:defRPr b="0" baseline="0" cap="none" i="0" spc="0" strike="noStrike" sz="3600" u="none" kumimoji="0" normalizeH="0">
+      <a:defRPr kumimoji="0" sz="3600" b="0" i="0" u="none" strike="noStrike" cap="none" spc="0" normalizeH="0" baseline="0">
         <a:ln>
           <a:noFill/>
         </a:ln>
@@ -147,7 +147,7 @@
       <a:buFontTx/>
       <a:buNone/>
       <a:tabLst/>
-      <a:defRPr b="0" baseline="0" cap="none" i="0" spc="0" strike="noStrike" sz="3600" u="none" kumimoji="0" normalizeH="0">
+      <a:defRPr kumimoji="0" sz="3600" b="0" i="0" u="none" strike="noStrike" cap="none" spc="0" normalizeH="0" baseline="0">
         <a:ln>
           <a:noFill/>
         </a:ln>
@@ -177,7 +177,7 @@
       <a:buFontTx/>
       <a:buNone/>
       <a:tabLst/>
-      <a:defRPr b="0" baseline="0" cap="none" i="0" spc="0" strike="noStrike" sz="3600" u="none" kumimoji="0" normalizeH="0">
+      <a:defRPr kumimoji="0" sz="3600" b="0" i="0" u="none" strike="noStrike" cap="none" spc="0" normalizeH="0" baseline="0">
         <a:ln>
           <a:noFill/>
         </a:ln>
@@ -207,7 +207,7 @@
       <a:buFontTx/>
       <a:buNone/>
       <a:tabLst/>
-      <a:defRPr b="0" baseline="0" cap="none" i="0" spc="0" strike="noStrike" sz="3600" u="none" kumimoji="0" normalizeH="0">
+      <a:defRPr kumimoji="0" sz="3600" b="0" i="0" u="none" strike="noStrike" cap="none" spc="0" normalizeH="0" baseline="0">
         <a:ln>
           <a:noFill/>
         </a:ln>
@@ -237,7 +237,7 @@
       <a:buFontTx/>
       <a:buNone/>
       <a:tabLst/>
-      <a:defRPr b="0" baseline="0" cap="none" i="0" spc="0" strike="noStrike" sz="3600" u="none" kumimoji="0" normalizeH="0">
+      <a:defRPr kumimoji="0" sz="3600" b="0" i="0" u="none" strike="noStrike" cap="none" spc="0" normalizeH="0" baseline="0">
         <a:ln>
           <a:noFill/>
         </a:ln>
@@ -267,7 +267,7 @@
       <a:buFontTx/>
       <a:buNone/>
       <a:tabLst/>
-      <a:defRPr b="0" baseline="0" cap="none" i="0" spc="0" strike="noStrike" sz="3600" u="none" kumimoji="0" normalizeH="0">
+      <a:defRPr kumimoji="0" sz="3600" b="0" i="0" u="none" strike="noStrike" cap="none" spc="0" normalizeH="0" baseline="0">
         <a:ln>
           <a:noFill/>
         </a:ln>
@@ -297,7 +297,7 @@
       <a:buFontTx/>
       <a:buNone/>
       <a:tabLst/>
-      <a:defRPr b="0" baseline="0" cap="none" i="0" spc="0" strike="noStrike" sz="3600" u="none" kumimoji="0" normalizeH="0">
+      <a:defRPr kumimoji="0" sz="3600" b="0" i="0" u="none" strike="noStrike" cap="none" spc="0" normalizeH="0" baseline="0">
         <a:ln>
           <a:noFill/>
         </a:ln>
@@ -316,13 +316,14 @@
 </p:presentation>
 </file>
 
-<file path=ppt/commentAuthors.xml><?xml version="1.0" encoding="utf-8"?>
-<p:cmAuthorLst xmlns:a="http://schemas.openxmlformats.org/drawingml/2006/main" xmlns:r="http://schemas.openxmlformats.org/officeDocument/2006/relationships" xmlns:p="http://schemas.openxmlformats.org/presentationml/2006/main"/>
-</file>
-
 <file path=ppt/notesMasters/notesMaster1.xml><?xml version="1.0" encoding="utf-8"?>
 <p:notesMaster xmlns:a="http://schemas.openxmlformats.org/drawingml/2006/main" xmlns:r="http://schemas.openxmlformats.org/officeDocument/2006/relationships" xmlns:p="http://schemas.openxmlformats.org/presentationml/2006/main">
   <p:cSld>
+    <p:bg>
+      <p:bgRef idx="1001">
+        <a:schemeClr val="bg1"/>
+      </p:bgRef>
+    </p:bg>
     <p:spTree>
       <p:nvGrpSpPr>
         <p:cNvPr id="1" name=""/>
@@ -340,7 +341,9 @@
       <p:sp>
         <p:nvSpPr>
           <p:cNvPr id="116" name="Shape 116"/>
-          <p:cNvSpPr/>
+          <p:cNvSpPr>
+            <a:spLocks noGrp="1" noRot="1" noChangeAspect="1"/>
+          </p:cNvSpPr>
           <p:nvPr>
             <p:ph type="sldImg"/>
           </p:nvPr>
@@ -358,14 +361,16 @@
           <a:bodyPr/>
           <a:lstStyle/>
           <a:p>
-            <a:pPr/>
+            <a:endParaRPr/>
           </a:p>
         </p:txBody>
       </p:sp>
       <p:sp>
         <p:nvSpPr>
           <p:cNvPr id="117" name="Shape 117"/>
-          <p:cNvSpPr/>
+          <p:cNvSpPr>
+            <a:spLocks noGrp="1"/>
+          </p:cNvSpPr>
           <p:nvPr>
             <p:ph type="body" sz="quarter" idx="1"/>
           </p:nvPr>
@@ -383,11 +388,16 @@
           <a:bodyPr/>
           <a:lstStyle/>
           <a:p>
-            <a:pPr/>
+            <a:endParaRPr/>
           </a:p>
         </p:txBody>
       </p:sp>
     </p:spTree>
+    <p:extLst>
+      <p:ext uri="{BB962C8B-B14F-4D97-AF65-F5344CB8AC3E}">
+        <p14:creationId xmlns:p14="http://schemas.microsoft.com/office/powerpoint/2010/main" val="2665195063"/>
+      </p:ext>
+    </p:extLst>
   </p:cSld>
   <p:clrMap bg1="lt1" tx1="dk1" bg2="lt2" tx2="dk2" accent1="accent1" accent2="accent2" accent3="accent3" accent4="accent4" accent5="accent5" accent6="accent6" hlink="hlink" folHlink="folHlink"/>
   <p:notesStyle>
@@ -495,7 +505,7 @@
 </file>
 
 <file path=ppt/slideLayouts/slideLayout1.xml><?xml version="1.0" encoding="utf-8"?>
-<p:sldLayout xmlns:a="http://schemas.openxmlformats.org/drawingml/2006/main" xmlns:r="http://schemas.openxmlformats.org/officeDocument/2006/relationships" xmlns:p="http://schemas.openxmlformats.org/presentationml/2006/main" type="title" showMasterSp="1" showMasterPhAnim="1">
+<p:sldLayout xmlns:a="http://schemas.openxmlformats.org/drawingml/2006/main" xmlns:r="http://schemas.openxmlformats.org/officeDocument/2006/relationships" xmlns:p="http://schemas.openxmlformats.org/presentationml/2006/main" type="title">
   <p:cSld name="Title &amp; Subtitle">
     <p:spTree>
       <p:nvGrpSpPr>
@@ -514,7 +524,9 @@
       <p:sp>
         <p:nvSpPr>
           <p:cNvPr id="11" name="Shape 11"/>
-          <p:cNvSpPr/>
+          <p:cNvSpPr>
+            <a:spLocks noGrp="1"/>
+          </p:cNvSpPr>
           <p:nvPr>
             <p:ph type="title"/>
           </p:nvPr>
@@ -532,7 +544,6 @@
           <a:bodyPr anchor="b"/>
           <a:lstStyle/>
           <a:p>
-            <a:pPr/>
             <a:r>
               <a:t>Title Text</a:t>
             </a:r>
@@ -542,7 +553,9 @@
       <p:sp>
         <p:nvSpPr>
           <p:cNvPr id="12" name="Shape 12"/>
-          <p:cNvSpPr/>
+          <p:cNvSpPr>
+            <a:spLocks noGrp="1"/>
+          </p:cNvSpPr>
           <p:nvPr>
             <p:ph type="body" sz="quarter" idx="1"/>
           </p:nvPr>
@@ -601,7 +614,6 @@
             </a:lvl5pPr>
           </a:lstStyle>
           <a:p>
-            <a:pPr/>
             <a:r>
               <a:t>Body Level One</a:t>
             </a:r>
@@ -635,7 +647,9 @@
       <p:sp>
         <p:nvSpPr>
           <p:cNvPr id="13" name="Shape 13"/>
-          <p:cNvSpPr/>
+          <p:cNvSpPr>
+            <a:spLocks noGrp="1"/>
+          </p:cNvSpPr>
           <p:nvPr>
             <p:ph type="sldNum" sz="quarter" idx="2"/>
           </p:nvPr>
@@ -649,8 +663,10 @@
           <a:bodyPr/>
           <a:lstStyle/>
           <a:p>
-            <a:pPr/>
-            <a:fld id="{86CB4B4D-7CA3-9044-876B-883B54F8677D}" type="slidenum"/>
+            <a:fld id="{86CB4B4D-7CA3-9044-876B-883B54F8677D}" type="slidenum">
+              <a:t>‹#›</a:t>
+            </a:fld>
+            <a:endParaRPr/>
           </a:p>
         </p:txBody>
       </p:sp>
@@ -659,138 +675,12 @@
   <p:clrMapOvr>
     <a:masterClrMapping/>
   </p:clrMapOvr>
-  <p:transition xmlns:p14="http://schemas.microsoft.com/office/powerpoint/2010/main" spd="med" advClick="1"/>
+  <p:transition spd="med"/>
 </p:sldLayout>
 </file>
 
 <file path=ppt/slideLayouts/slideLayout10.xml><?xml version="1.0" encoding="utf-8"?>
-<p:sldLayout xmlns:a="http://schemas.openxmlformats.org/drawingml/2006/main" xmlns:r="http://schemas.openxmlformats.org/officeDocument/2006/relationships" xmlns:p="http://schemas.openxmlformats.org/presentationml/2006/main" type="tx" showMasterSp="1" showMasterPhAnim="1">
-  <p:cSld name="Quote">
-    <p:spTree>
-      <p:nvGrpSpPr>
-        <p:cNvPr id="1" name=""/>
-        <p:cNvGrpSpPr/>
-        <p:nvPr/>
-      </p:nvGrpSpPr>
-      <p:grpSpPr>
-        <a:xfrm>
-          <a:off x="0" y="0"/>
-          <a:ext cx="0" cy="0"/>
-          <a:chOff x="0" y="0"/>
-          <a:chExt cx="0" cy="0"/>
-        </a:xfrm>
-      </p:grpSpPr>
-      <p:sp>
-        <p:nvSpPr>
-          <p:cNvPr id="93" name="Shape 93"/>
-          <p:cNvSpPr/>
-          <p:nvPr>
-            <p:ph type="body" sz="quarter" idx="13"/>
-          </p:nvPr>
-        </p:nvSpPr>
-        <p:spPr>
-          <a:xfrm>
-            <a:off x="1270000" y="6362700"/>
-            <a:ext cx="10464800" cy="469900"/>
-          </a:xfrm>
-          <a:prstGeom prst="rect">
-            <a:avLst/>
-          </a:prstGeom>
-        </p:spPr>
-        <p:txBody>
-          <a:bodyPr anchor="t">
-            <a:spAutoFit/>
-          </a:bodyPr>
-          <a:lstStyle>
-            <a:lvl1pPr marL="0" indent="0" algn="ctr">
-              <a:spcBef>
-                <a:spcPts val="0"/>
-              </a:spcBef>
-              <a:buSzTx/>
-              <a:buNone/>
-              <a:defRPr sz="2400"/>
-            </a:lvl1pPr>
-          </a:lstStyle>
-          <a:p>
-            <a:pPr/>
-            <a:r>
-              <a:t>–Johnny Appleseed</a:t>
-            </a:r>
-          </a:p>
-        </p:txBody>
-      </p:sp>
-      <p:sp>
-        <p:nvSpPr>
-          <p:cNvPr id="94" name="Shape 94"/>
-          <p:cNvSpPr/>
-          <p:nvPr>
-            <p:ph type="body" sz="quarter" idx="14"/>
-          </p:nvPr>
-        </p:nvSpPr>
-        <p:spPr>
-          <a:xfrm>
-            <a:off x="1270000" y="4267200"/>
-            <a:ext cx="10464800" cy="685800"/>
-          </a:xfrm>
-          <a:prstGeom prst="rect">
-            <a:avLst/>
-          </a:prstGeom>
-        </p:spPr>
-        <p:txBody>
-          <a:bodyPr>
-            <a:spAutoFit/>
-          </a:bodyPr>
-          <a:lstStyle>
-            <a:lvl1pPr marL="0" indent="0" algn="ctr">
-              <a:spcBef>
-                <a:spcPts val="0"/>
-              </a:spcBef>
-              <a:buSzTx/>
-              <a:buNone/>
-              <a:defRPr sz="3800"/>
-            </a:lvl1pPr>
-          </a:lstStyle>
-          <a:p>
-            <a:pPr/>
-            <a:r>
-              <a:t>“Type a quote here.” </a:t>
-            </a:r>
-          </a:p>
-        </p:txBody>
-      </p:sp>
-      <p:sp>
-        <p:nvSpPr>
-          <p:cNvPr id="95" name="Shape 95"/>
-          <p:cNvSpPr/>
-          <p:nvPr>
-            <p:ph type="sldNum" sz="quarter" idx="2"/>
-          </p:nvPr>
-        </p:nvSpPr>
-        <p:spPr>
-          <a:prstGeom prst="rect">
-            <a:avLst/>
-          </a:prstGeom>
-        </p:spPr>
-        <p:txBody>
-          <a:bodyPr/>
-          <a:lstStyle/>
-          <a:p>
-            <a:pPr/>
-            <a:fld id="{86CB4B4D-7CA3-9044-876B-883B54F8677D}" type="slidenum"/>
-          </a:p>
-        </p:txBody>
-      </p:sp>
-    </p:spTree>
-  </p:cSld>
-  <p:clrMapOvr>
-    <a:masterClrMapping/>
-  </p:clrMapOvr>
-  <p:transition xmlns:p14="http://schemas.microsoft.com/office/powerpoint/2010/main" spd="med" advClick="1"/>
-</p:sldLayout>
-</file>
-
-<file path=ppt/slideLayouts/slideLayout11.xml><?xml version="1.0" encoding="utf-8"?>
-<p:sldLayout xmlns:a="http://schemas.openxmlformats.org/drawingml/2006/main" xmlns:r="http://schemas.openxmlformats.org/officeDocument/2006/relationships" xmlns:p="http://schemas.openxmlformats.org/presentationml/2006/main" type="tx" showMasterSp="1" showMasterPhAnim="1">
+<p:sldLayout xmlns:a="http://schemas.openxmlformats.org/drawingml/2006/main" xmlns:r="http://schemas.openxmlformats.org/officeDocument/2006/relationships" xmlns:p="http://schemas.openxmlformats.org/presentationml/2006/main" type="tx">
   <p:cSld name="Photo">
     <p:spTree>
       <p:nvGrpSpPr>
@@ -809,7 +699,9 @@
       <p:sp>
         <p:nvSpPr>
           <p:cNvPr id="102" name="Shape 102"/>
-          <p:cNvSpPr/>
+          <p:cNvSpPr>
+            <a:spLocks noGrp="1"/>
+          </p:cNvSpPr>
           <p:nvPr>
             <p:ph type="pic" idx="13"/>
           </p:nvPr>
@@ -829,14 +721,16 @@
           </a:bodyPr>
           <a:lstStyle/>
           <a:p>
-            <a:pPr/>
+            <a:endParaRPr/>
           </a:p>
         </p:txBody>
       </p:sp>
       <p:sp>
         <p:nvSpPr>
           <p:cNvPr id="103" name="Shape 103"/>
-          <p:cNvSpPr/>
+          <p:cNvSpPr>
+            <a:spLocks noGrp="1"/>
+          </p:cNvSpPr>
           <p:nvPr>
             <p:ph type="sldNum" sz="quarter" idx="2"/>
           </p:nvPr>
@@ -850,8 +744,10 @@
           <a:bodyPr/>
           <a:lstStyle/>
           <a:p>
-            <a:pPr/>
-            <a:fld id="{86CB4B4D-7CA3-9044-876B-883B54F8677D}" type="slidenum"/>
+            <a:fld id="{86CB4B4D-7CA3-9044-876B-883B54F8677D}" type="slidenum">
+              <a:t>‹#›</a:t>
+            </a:fld>
+            <a:endParaRPr/>
           </a:p>
         </p:txBody>
       </p:sp>
@@ -860,12 +756,12 @@
   <p:clrMapOvr>
     <a:masterClrMapping/>
   </p:clrMapOvr>
-  <p:transition xmlns:p14="http://schemas.microsoft.com/office/powerpoint/2010/main" spd="med" advClick="1"/>
+  <p:transition spd="med"/>
 </p:sldLayout>
 </file>
 
-<file path=ppt/slideLayouts/slideLayout12.xml><?xml version="1.0" encoding="utf-8"?>
-<p:sldLayout xmlns:a="http://schemas.openxmlformats.org/drawingml/2006/main" xmlns:r="http://schemas.openxmlformats.org/officeDocument/2006/relationships" xmlns:p="http://schemas.openxmlformats.org/presentationml/2006/main" type="tx" showMasterSp="1" showMasterPhAnim="1">
+<file path=ppt/slideLayouts/slideLayout11.xml><?xml version="1.0" encoding="utf-8"?>
+<p:sldLayout xmlns:a="http://schemas.openxmlformats.org/drawingml/2006/main" xmlns:r="http://schemas.openxmlformats.org/officeDocument/2006/relationships" xmlns:p="http://schemas.openxmlformats.org/presentationml/2006/main" type="tx">
   <p:cSld name="Blank">
     <p:spTree>
       <p:nvGrpSpPr>
@@ -884,7 +780,9 @@
       <p:sp>
         <p:nvSpPr>
           <p:cNvPr id="110" name="Shape 110"/>
-          <p:cNvSpPr/>
+          <p:cNvSpPr>
+            <a:spLocks noGrp="1"/>
+          </p:cNvSpPr>
           <p:nvPr>
             <p:ph type="sldNum" sz="quarter" idx="2"/>
           </p:nvPr>
@@ -898,8 +796,10 @@
           <a:bodyPr/>
           <a:lstStyle/>
           <a:p>
-            <a:pPr/>
-            <a:fld id="{86CB4B4D-7CA3-9044-876B-883B54F8677D}" type="slidenum"/>
+            <a:fld id="{86CB4B4D-7CA3-9044-876B-883B54F8677D}" type="slidenum">
+              <a:t>‹#›</a:t>
+            </a:fld>
+            <a:endParaRPr/>
           </a:p>
         </p:txBody>
       </p:sp>
@@ -908,12 +808,12 @@
   <p:clrMapOvr>
     <a:masterClrMapping/>
   </p:clrMapOvr>
-  <p:transition xmlns:p14="http://schemas.microsoft.com/office/powerpoint/2010/main" spd="med" advClick="1"/>
+  <p:transition spd="med"/>
 </p:sldLayout>
 </file>
 
 <file path=ppt/slideLayouts/slideLayout2.xml><?xml version="1.0" encoding="utf-8"?>
-<p:sldLayout xmlns:a="http://schemas.openxmlformats.org/drawingml/2006/main" xmlns:r="http://schemas.openxmlformats.org/officeDocument/2006/relationships" xmlns:p="http://schemas.openxmlformats.org/presentationml/2006/main" type="tx" showMasterSp="1" showMasterPhAnim="1">
+<p:sldLayout xmlns:a="http://schemas.openxmlformats.org/drawingml/2006/main" xmlns:r="http://schemas.openxmlformats.org/officeDocument/2006/relationships" xmlns:p="http://schemas.openxmlformats.org/presentationml/2006/main" type="tx">
   <p:cSld name="Photo - Horizontal">
     <p:spTree>
       <p:nvGrpSpPr>
@@ -932,7 +832,9 @@
       <p:sp>
         <p:nvSpPr>
           <p:cNvPr id="20" name="Shape 20"/>
-          <p:cNvSpPr/>
+          <p:cNvSpPr>
+            <a:spLocks noGrp="1"/>
+          </p:cNvSpPr>
           <p:nvPr>
             <p:ph type="pic" idx="13"/>
           </p:nvPr>
@@ -952,14 +854,16 @@
           </a:bodyPr>
           <a:lstStyle/>
           <a:p>
-            <a:pPr/>
+            <a:endParaRPr/>
           </a:p>
         </p:txBody>
       </p:sp>
       <p:sp>
         <p:nvSpPr>
           <p:cNvPr id="21" name="Shape 21"/>
-          <p:cNvSpPr/>
+          <p:cNvSpPr>
+            <a:spLocks noGrp="1"/>
+          </p:cNvSpPr>
           <p:nvPr>
             <p:ph type="title"/>
           </p:nvPr>
@@ -977,7 +881,6 @@
           <a:bodyPr anchor="b"/>
           <a:lstStyle/>
           <a:p>
-            <a:pPr/>
             <a:r>
               <a:t>Title Text</a:t>
             </a:r>
@@ -987,7 +890,9 @@
       <p:sp>
         <p:nvSpPr>
           <p:cNvPr id="22" name="Shape 22"/>
-          <p:cNvSpPr/>
+          <p:cNvSpPr>
+            <a:spLocks noGrp="1"/>
+          </p:cNvSpPr>
           <p:nvPr>
             <p:ph type="body" sz="quarter" idx="1"/>
           </p:nvPr>
@@ -1046,7 +951,6 @@
             </a:lvl5pPr>
           </a:lstStyle>
           <a:p>
-            <a:pPr/>
             <a:r>
               <a:t>Body Level One</a:t>
             </a:r>
@@ -1080,7 +984,9 @@
       <p:sp>
         <p:nvSpPr>
           <p:cNvPr id="23" name="Shape 23"/>
-          <p:cNvSpPr/>
+          <p:cNvSpPr>
+            <a:spLocks noGrp="1"/>
+          </p:cNvSpPr>
           <p:nvPr>
             <p:ph type="sldNum" sz="quarter" idx="2"/>
           </p:nvPr>
@@ -1098,8 +1004,10 @@
           <a:bodyPr/>
           <a:lstStyle/>
           <a:p>
-            <a:pPr/>
-            <a:fld id="{86CB4B4D-7CA3-9044-876B-883B54F8677D}" type="slidenum"/>
+            <a:fld id="{86CB4B4D-7CA3-9044-876B-883B54F8677D}" type="slidenum">
+              <a:t>‹#›</a:t>
+            </a:fld>
+            <a:endParaRPr/>
           </a:p>
         </p:txBody>
       </p:sp>
@@ -1108,12 +1016,12 @@
   <p:clrMapOvr>
     <a:masterClrMapping/>
   </p:clrMapOvr>
-  <p:transition xmlns:p14="http://schemas.microsoft.com/office/powerpoint/2010/main" spd="med" advClick="1"/>
+  <p:transition spd="med"/>
 </p:sldLayout>
 </file>
 
 <file path=ppt/slideLayouts/slideLayout3.xml><?xml version="1.0" encoding="utf-8"?>
-<p:sldLayout xmlns:a="http://schemas.openxmlformats.org/drawingml/2006/main" xmlns:r="http://schemas.openxmlformats.org/officeDocument/2006/relationships" xmlns:p="http://schemas.openxmlformats.org/presentationml/2006/main" type="tx" showMasterSp="1" showMasterPhAnim="1">
+<p:sldLayout xmlns:a="http://schemas.openxmlformats.org/drawingml/2006/main" xmlns:r="http://schemas.openxmlformats.org/officeDocument/2006/relationships" xmlns:p="http://schemas.openxmlformats.org/presentationml/2006/main" type="tx">
   <p:cSld name="Title - Center">
     <p:spTree>
       <p:nvGrpSpPr>
@@ -1132,7 +1040,9 @@
       <p:sp>
         <p:nvSpPr>
           <p:cNvPr id="30" name="Shape 30"/>
-          <p:cNvSpPr/>
+          <p:cNvSpPr>
+            <a:spLocks noGrp="1"/>
+          </p:cNvSpPr>
           <p:nvPr>
             <p:ph type="title"/>
           </p:nvPr>
@@ -1150,7 +1060,6 @@
           <a:bodyPr/>
           <a:lstStyle/>
           <a:p>
-            <a:pPr/>
             <a:r>
               <a:t>Title Text</a:t>
             </a:r>
@@ -1160,7 +1069,9 @@
       <p:sp>
         <p:nvSpPr>
           <p:cNvPr id="31" name="Shape 31"/>
-          <p:cNvSpPr/>
+          <p:cNvSpPr>
+            <a:spLocks noGrp="1"/>
+          </p:cNvSpPr>
           <p:nvPr>
             <p:ph type="sldNum" sz="quarter" idx="2"/>
           </p:nvPr>
@@ -1174,8 +1085,10 @@
           <a:bodyPr/>
           <a:lstStyle/>
           <a:p>
-            <a:pPr/>
-            <a:fld id="{86CB4B4D-7CA3-9044-876B-883B54F8677D}" type="slidenum"/>
+            <a:fld id="{86CB4B4D-7CA3-9044-876B-883B54F8677D}" type="slidenum">
+              <a:t>‹#›</a:t>
+            </a:fld>
+            <a:endParaRPr/>
           </a:p>
         </p:txBody>
       </p:sp>
@@ -1184,12 +1097,12 @@
   <p:clrMapOvr>
     <a:masterClrMapping/>
   </p:clrMapOvr>
-  <p:transition xmlns:p14="http://schemas.microsoft.com/office/powerpoint/2010/main" spd="med" advClick="1"/>
+  <p:transition spd="med"/>
 </p:sldLayout>
 </file>
 
 <file path=ppt/slideLayouts/slideLayout4.xml><?xml version="1.0" encoding="utf-8"?>
-<p:sldLayout xmlns:a="http://schemas.openxmlformats.org/drawingml/2006/main" xmlns:r="http://schemas.openxmlformats.org/officeDocument/2006/relationships" xmlns:p="http://schemas.openxmlformats.org/presentationml/2006/main" type="tx" showMasterSp="1" showMasterPhAnim="1">
+<p:sldLayout xmlns:a="http://schemas.openxmlformats.org/drawingml/2006/main" xmlns:r="http://schemas.openxmlformats.org/officeDocument/2006/relationships" xmlns:p="http://schemas.openxmlformats.org/presentationml/2006/main" type="tx">
   <p:cSld name="Photo - Vertical">
     <p:spTree>
       <p:nvGrpSpPr>
@@ -1208,7 +1121,9 @@
       <p:sp>
         <p:nvSpPr>
           <p:cNvPr id="38" name="Shape 38"/>
-          <p:cNvSpPr/>
+          <p:cNvSpPr>
+            <a:spLocks noGrp="1"/>
+          </p:cNvSpPr>
           <p:nvPr>
             <p:ph type="pic" sz="half" idx="13"/>
           </p:nvPr>
@@ -1228,14 +1143,16 @@
           </a:bodyPr>
           <a:lstStyle/>
           <a:p>
-            <a:pPr/>
+            <a:endParaRPr/>
           </a:p>
         </p:txBody>
       </p:sp>
       <p:sp>
         <p:nvSpPr>
           <p:cNvPr id="39" name="Shape 39"/>
-          <p:cNvSpPr/>
+          <p:cNvSpPr>
+            <a:spLocks noGrp="1"/>
+          </p:cNvSpPr>
           <p:nvPr>
             <p:ph type="title"/>
           </p:nvPr>
@@ -1257,7 +1174,6 @@
             </a:lvl1pPr>
           </a:lstStyle>
           <a:p>
-            <a:pPr/>
             <a:r>
               <a:t>Title Text</a:t>
             </a:r>
@@ -1267,7 +1183,9 @@
       <p:sp>
         <p:nvSpPr>
           <p:cNvPr id="40" name="Shape 40"/>
-          <p:cNvSpPr/>
+          <p:cNvSpPr>
+            <a:spLocks noGrp="1"/>
+          </p:cNvSpPr>
           <p:nvPr>
             <p:ph type="body" sz="quarter" idx="1"/>
           </p:nvPr>
@@ -1326,7 +1244,6 @@
             </a:lvl5pPr>
           </a:lstStyle>
           <a:p>
-            <a:pPr/>
             <a:r>
               <a:t>Body Level One</a:t>
             </a:r>
@@ -1360,7 +1277,9 @@
       <p:sp>
         <p:nvSpPr>
           <p:cNvPr id="41" name="Shape 41"/>
-          <p:cNvSpPr/>
+          <p:cNvSpPr>
+            <a:spLocks noGrp="1"/>
+          </p:cNvSpPr>
           <p:nvPr>
             <p:ph type="sldNum" sz="quarter" idx="2"/>
           </p:nvPr>
@@ -1374,8 +1293,10 @@
           <a:bodyPr/>
           <a:lstStyle/>
           <a:p>
-            <a:pPr/>
-            <a:fld id="{86CB4B4D-7CA3-9044-876B-883B54F8677D}" type="slidenum"/>
+            <a:fld id="{86CB4B4D-7CA3-9044-876B-883B54F8677D}" type="slidenum">
+              <a:t>‹#›</a:t>
+            </a:fld>
+            <a:endParaRPr/>
           </a:p>
         </p:txBody>
       </p:sp>
@@ -1384,84 +1305,12 @@
   <p:clrMapOvr>
     <a:masterClrMapping/>
   </p:clrMapOvr>
-  <p:transition xmlns:p14="http://schemas.microsoft.com/office/powerpoint/2010/main" spd="med" advClick="1"/>
+  <p:transition spd="med"/>
 </p:sldLayout>
 </file>
 
 <file path=ppt/slideLayouts/slideLayout5.xml><?xml version="1.0" encoding="utf-8"?>
-<p:sldLayout xmlns:a="http://schemas.openxmlformats.org/drawingml/2006/main" xmlns:r="http://schemas.openxmlformats.org/officeDocument/2006/relationships" xmlns:p="http://schemas.openxmlformats.org/presentationml/2006/main" type="tx" showMasterSp="1" showMasterPhAnim="1">
-  <p:cSld name="Title - Top">
-    <p:spTree>
-      <p:nvGrpSpPr>
-        <p:cNvPr id="1" name=""/>
-        <p:cNvGrpSpPr/>
-        <p:nvPr/>
-      </p:nvGrpSpPr>
-      <p:grpSpPr>
-        <a:xfrm>
-          <a:off x="0" y="0"/>
-          <a:ext cx="0" cy="0"/>
-          <a:chOff x="0" y="0"/>
-          <a:chExt cx="0" cy="0"/>
-        </a:xfrm>
-      </p:grpSpPr>
-      <p:sp>
-        <p:nvSpPr>
-          <p:cNvPr id="48" name="Shape 48"/>
-          <p:cNvSpPr/>
-          <p:nvPr>
-            <p:ph type="title"/>
-          </p:nvPr>
-        </p:nvSpPr>
-        <p:spPr>
-          <a:prstGeom prst="rect">
-            <a:avLst/>
-          </a:prstGeom>
-        </p:spPr>
-        <p:txBody>
-          <a:bodyPr/>
-          <a:lstStyle/>
-          <a:p>
-            <a:pPr/>
-            <a:r>
-              <a:t>Title Text</a:t>
-            </a:r>
-          </a:p>
-        </p:txBody>
-      </p:sp>
-      <p:sp>
-        <p:nvSpPr>
-          <p:cNvPr id="49" name="Shape 49"/>
-          <p:cNvSpPr/>
-          <p:nvPr>
-            <p:ph type="sldNum" sz="quarter" idx="2"/>
-          </p:nvPr>
-        </p:nvSpPr>
-        <p:spPr>
-          <a:prstGeom prst="rect">
-            <a:avLst/>
-          </a:prstGeom>
-        </p:spPr>
-        <p:txBody>
-          <a:bodyPr/>
-          <a:lstStyle/>
-          <a:p>
-            <a:pPr/>
-            <a:fld id="{86CB4B4D-7CA3-9044-876B-883B54F8677D}" type="slidenum"/>
-          </a:p>
-        </p:txBody>
-      </p:sp>
-    </p:spTree>
-  </p:cSld>
-  <p:clrMapOvr>
-    <a:masterClrMapping/>
-  </p:clrMapOvr>
-  <p:transition xmlns:p14="http://schemas.microsoft.com/office/powerpoint/2010/main" spd="med" advClick="1"/>
-</p:sldLayout>
-</file>
-
-<file path=ppt/slideLayouts/slideLayout6.xml><?xml version="1.0" encoding="utf-8"?>
-<p:sldLayout xmlns:a="http://schemas.openxmlformats.org/drawingml/2006/main" xmlns:r="http://schemas.openxmlformats.org/officeDocument/2006/relationships" xmlns:p="http://schemas.openxmlformats.org/presentationml/2006/main" type="tx" showMasterSp="1" showMasterPhAnim="1">
+<p:sldLayout xmlns:a="http://schemas.openxmlformats.org/drawingml/2006/main" xmlns:r="http://schemas.openxmlformats.org/officeDocument/2006/relationships" xmlns:p="http://schemas.openxmlformats.org/presentationml/2006/main" type="tx">
   <p:cSld name="Title &amp; Bullets">
     <p:spTree>
       <p:nvGrpSpPr>
@@ -1480,7 +1329,9 @@
       <p:sp>
         <p:nvSpPr>
           <p:cNvPr id="56" name="Shape 56"/>
-          <p:cNvSpPr/>
+          <p:cNvSpPr>
+            <a:spLocks noGrp="1"/>
+          </p:cNvSpPr>
           <p:nvPr>
             <p:ph type="title"/>
           </p:nvPr>
@@ -1494,7 +1345,6 @@
           <a:bodyPr/>
           <a:lstStyle/>
           <a:p>
-            <a:pPr/>
             <a:r>
               <a:t>Title Text</a:t>
             </a:r>
@@ -1504,7 +1354,9 @@
       <p:sp>
         <p:nvSpPr>
           <p:cNvPr id="57" name="Shape 57"/>
-          <p:cNvSpPr/>
+          <p:cNvSpPr>
+            <a:spLocks noGrp="1"/>
+          </p:cNvSpPr>
           <p:nvPr>
             <p:ph type="body" idx="1"/>
           </p:nvPr>
@@ -1518,7 +1370,6 @@
           <a:bodyPr/>
           <a:lstStyle/>
           <a:p>
-            <a:pPr/>
             <a:r>
               <a:t>Body Level One</a:t>
             </a:r>
@@ -1552,7 +1403,9 @@
       <p:sp>
         <p:nvSpPr>
           <p:cNvPr id="58" name="Shape 58"/>
-          <p:cNvSpPr/>
+          <p:cNvSpPr>
+            <a:spLocks noGrp="1"/>
+          </p:cNvSpPr>
           <p:nvPr>
             <p:ph type="sldNum" sz="quarter" idx="2"/>
           </p:nvPr>
@@ -1566,8 +1419,10 @@
           <a:bodyPr/>
           <a:lstStyle/>
           <a:p>
-            <a:pPr/>
-            <a:fld id="{86CB4B4D-7CA3-9044-876B-883B54F8677D}" type="slidenum"/>
+            <a:fld id="{86CB4B4D-7CA3-9044-876B-883B54F8677D}" type="slidenum">
+              <a:t>‹#›</a:t>
+            </a:fld>
+            <a:endParaRPr/>
           </a:p>
         </p:txBody>
       </p:sp>
@@ -1576,12 +1431,12 @@
   <p:clrMapOvr>
     <a:masterClrMapping/>
   </p:clrMapOvr>
-  <p:transition xmlns:p14="http://schemas.microsoft.com/office/powerpoint/2010/main" spd="med" advClick="1"/>
+  <p:transition spd="med"/>
 </p:sldLayout>
 </file>
 
-<file path=ppt/slideLayouts/slideLayout7.xml><?xml version="1.0" encoding="utf-8"?>
-<p:sldLayout xmlns:a="http://schemas.openxmlformats.org/drawingml/2006/main" xmlns:r="http://schemas.openxmlformats.org/officeDocument/2006/relationships" xmlns:p="http://schemas.openxmlformats.org/presentationml/2006/main" type="tx" showMasterSp="1" showMasterPhAnim="1">
+<file path=ppt/slideLayouts/slideLayout6.xml><?xml version="1.0" encoding="utf-8"?>
+<p:sldLayout xmlns:a="http://schemas.openxmlformats.org/drawingml/2006/main" xmlns:r="http://schemas.openxmlformats.org/officeDocument/2006/relationships" xmlns:p="http://schemas.openxmlformats.org/presentationml/2006/main" type="tx">
   <p:cSld name="Title, Bullets &amp; Photo">
     <p:spTree>
       <p:nvGrpSpPr>
@@ -1600,7 +1455,9 @@
       <p:sp>
         <p:nvSpPr>
           <p:cNvPr id="65" name="Shape 65"/>
-          <p:cNvSpPr/>
+          <p:cNvSpPr>
+            <a:spLocks noGrp="1"/>
+          </p:cNvSpPr>
           <p:nvPr>
             <p:ph type="pic" sz="half" idx="13"/>
           </p:nvPr>
@@ -1620,14 +1477,16 @@
           </a:bodyPr>
           <a:lstStyle/>
           <a:p>
-            <a:pPr/>
+            <a:endParaRPr/>
           </a:p>
         </p:txBody>
       </p:sp>
       <p:sp>
         <p:nvSpPr>
           <p:cNvPr id="66" name="Shape 66"/>
-          <p:cNvSpPr/>
+          <p:cNvSpPr>
+            <a:spLocks noGrp="1"/>
+          </p:cNvSpPr>
           <p:nvPr>
             <p:ph type="title"/>
           </p:nvPr>
@@ -1641,7 +1500,6 @@
           <a:bodyPr/>
           <a:lstStyle/>
           <a:p>
-            <a:pPr/>
             <a:r>
               <a:t>Title Text</a:t>
             </a:r>
@@ -1651,7 +1509,9 @@
       <p:sp>
         <p:nvSpPr>
           <p:cNvPr id="67" name="Shape 67"/>
-          <p:cNvSpPr/>
+          <p:cNvSpPr>
+            <a:spLocks noGrp="1"/>
+          </p:cNvSpPr>
           <p:nvPr>
             <p:ph type="body" sz="half" idx="1"/>
           </p:nvPr>
@@ -1700,7 +1560,6 @@
             </a:lvl5pPr>
           </a:lstStyle>
           <a:p>
-            <a:pPr/>
             <a:r>
               <a:t>Body Level One</a:t>
             </a:r>
@@ -1734,7 +1593,9 @@
       <p:sp>
         <p:nvSpPr>
           <p:cNvPr id="68" name="Shape 68"/>
-          <p:cNvSpPr/>
+          <p:cNvSpPr>
+            <a:spLocks noGrp="1"/>
+          </p:cNvSpPr>
           <p:nvPr>
             <p:ph type="sldNum" sz="quarter" idx="2"/>
           </p:nvPr>
@@ -1748,8 +1609,10 @@
           <a:bodyPr/>
           <a:lstStyle/>
           <a:p>
-            <a:pPr/>
-            <a:fld id="{86CB4B4D-7CA3-9044-876B-883B54F8677D}" type="slidenum"/>
+            <a:fld id="{86CB4B4D-7CA3-9044-876B-883B54F8677D}" type="slidenum">
+              <a:t>‹#›</a:t>
+            </a:fld>
+            <a:endParaRPr/>
           </a:p>
         </p:txBody>
       </p:sp>
@@ -1758,12 +1621,12 @@
   <p:clrMapOvr>
     <a:masterClrMapping/>
   </p:clrMapOvr>
-  <p:transition xmlns:p14="http://schemas.microsoft.com/office/powerpoint/2010/main" spd="med" advClick="1"/>
+  <p:transition spd="med"/>
 </p:sldLayout>
 </file>
 
-<file path=ppt/slideLayouts/slideLayout8.xml><?xml version="1.0" encoding="utf-8"?>
-<p:sldLayout xmlns:a="http://schemas.openxmlformats.org/drawingml/2006/main" xmlns:r="http://schemas.openxmlformats.org/officeDocument/2006/relationships" xmlns:p="http://schemas.openxmlformats.org/presentationml/2006/main" type="tx" showMasterSp="1" showMasterPhAnim="1">
+<file path=ppt/slideLayouts/slideLayout7.xml><?xml version="1.0" encoding="utf-8"?>
+<p:sldLayout xmlns:a="http://schemas.openxmlformats.org/drawingml/2006/main" xmlns:r="http://schemas.openxmlformats.org/officeDocument/2006/relationships" xmlns:p="http://schemas.openxmlformats.org/presentationml/2006/main" type="tx">
   <p:cSld name="Bullets">
     <p:spTree>
       <p:nvGrpSpPr>
@@ -1782,7 +1645,9 @@
       <p:sp>
         <p:nvSpPr>
           <p:cNvPr id="75" name="Shape 75"/>
-          <p:cNvSpPr/>
+          <p:cNvSpPr>
+            <a:spLocks noGrp="1"/>
+          </p:cNvSpPr>
           <p:nvPr>
             <p:ph type="body" idx="1"/>
           </p:nvPr>
@@ -1800,7 +1665,6 @@
           <a:bodyPr/>
           <a:lstStyle/>
           <a:p>
-            <a:pPr/>
             <a:r>
               <a:t>Body Level One</a:t>
             </a:r>
@@ -1834,7 +1698,9 @@
       <p:sp>
         <p:nvSpPr>
           <p:cNvPr id="76" name="Shape 76"/>
-          <p:cNvSpPr/>
+          <p:cNvSpPr>
+            <a:spLocks noGrp="1"/>
+          </p:cNvSpPr>
           <p:nvPr>
             <p:ph type="sldNum" sz="quarter" idx="2"/>
           </p:nvPr>
@@ -1848,8 +1714,10 @@
           <a:bodyPr/>
           <a:lstStyle/>
           <a:p>
-            <a:pPr/>
-            <a:fld id="{86CB4B4D-7CA3-9044-876B-883B54F8677D}" type="slidenum"/>
+            <a:fld id="{86CB4B4D-7CA3-9044-876B-883B54F8677D}" type="slidenum">
+              <a:t>‹#›</a:t>
+            </a:fld>
+            <a:endParaRPr/>
           </a:p>
         </p:txBody>
       </p:sp>
@@ -1858,12 +1726,12 @@
   <p:clrMapOvr>
     <a:masterClrMapping/>
   </p:clrMapOvr>
-  <p:transition xmlns:p14="http://schemas.microsoft.com/office/powerpoint/2010/main" spd="med" advClick="1"/>
+  <p:transition spd="med"/>
 </p:sldLayout>
 </file>
 
-<file path=ppt/slideLayouts/slideLayout9.xml><?xml version="1.0" encoding="utf-8"?>
-<p:sldLayout xmlns:a="http://schemas.openxmlformats.org/drawingml/2006/main" xmlns:r="http://schemas.openxmlformats.org/officeDocument/2006/relationships" xmlns:p="http://schemas.openxmlformats.org/presentationml/2006/main" type="tx" showMasterSp="1" showMasterPhAnim="1">
+<file path=ppt/slideLayouts/slideLayout8.xml><?xml version="1.0" encoding="utf-8"?>
+<p:sldLayout xmlns:a="http://schemas.openxmlformats.org/drawingml/2006/main" xmlns:r="http://schemas.openxmlformats.org/officeDocument/2006/relationships" xmlns:p="http://schemas.openxmlformats.org/presentationml/2006/main" type="tx">
   <p:cSld name="Photo - 3 Up">
     <p:spTree>
       <p:nvGrpSpPr>
@@ -1882,7 +1750,9 @@
       <p:sp>
         <p:nvSpPr>
           <p:cNvPr id="83" name="Shape 83"/>
-          <p:cNvSpPr/>
+          <p:cNvSpPr>
+            <a:spLocks noGrp="1"/>
+          </p:cNvSpPr>
           <p:nvPr>
             <p:ph type="pic" sz="quarter" idx="13"/>
           </p:nvPr>
@@ -1902,14 +1772,16 @@
           </a:bodyPr>
           <a:lstStyle/>
           <a:p>
-            <a:pPr/>
+            <a:endParaRPr/>
           </a:p>
         </p:txBody>
       </p:sp>
       <p:sp>
         <p:nvSpPr>
           <p:cNvPr id="84" name="Shape 84"/>
-          <p:cNvSpPr/>
+          <p:cNvSpPr>
+            <a:spLocks noGrp="1"/>
+          </p:cNvSpPr>
           <p:nvPr>
             <p:ph type="pic" sz="quarter" idx="14"/>
           </p:nvPr>
@@ -1929,14 +1801,16 @@
           </a:bodyPr>
           <a:lstStyle/>
           <a:p>
-            <a:pPr/>
+            <a:endParaRPr/>
           </a:p>
         </p:txBody>
       </p:sp>
       <p:sp>
         <p:nvSpPr>
           <p:cNvPr id="85" name="Shape 85"/>
-          <p:cNvSpPr/>
+          <p:cNvSpPr>
+            <a:spLocks noGrp="1"/>
+          </p:cNvSpPr>
           <p:nvPr>
             <p:ph type="pic" sz="half" idx="15"/>
           </p:nvPr>
@@ -1956,14 +1830,16 @@
           </a:bodyPr>
           <a:lstStyle/>
           <a:p>
-            <a:pPr/>
+            <a:endParaRPr/>
           </a:p>
         </p:txBody>
       </p:sp>
       <p:sp>
         <p:nvSpPr>
           <p:cNvPr id="86" name="Shape 86"/>
-          <p:cNvSpPr/>
+          <p:cNvSpPr>
+            <a:spLocks noGrp="1"/>
+          </p:cNvSpPr>
           <p:nvPr>
             <p:ph type="sldNum" sz="quarter" idx="2"/>
           </p:nvPr>
@@ -1977,8 +1853,10 @@
           <a:bodyPr/>
           <a:lstStyle/>
           <a:p>
-            <a:pPr/>
-            <a:fld id="{86CB4B4D-7CA3-9044-876B-883B54F8677D}" type="slidenum"/>
+            <a:fld id="{86CB4B4D-7CA3-9044-876B-883B54F8677D}" type="slidenum">
+              <a:t>‹#›</a:t>
+            </a:fld>
+            <a:endParaRPr/>
           </a:p>
         </p:txBody>
       </p:sp>
@@ -1987,7 +1865,139 @@
   <p:clrMapOvr>
     <a:masterClrMapping/>
   </p:clrMapOvr>
-  <p:transition xmlns:p14="http://schemas.microsoft.com/office/powerpoint/2010/main" spd="med" advClick="1"/>
+  <p:transition spd="med"/>
+</p:sldLayout>
+</file>
+
+<file path=ppt/slideLayouts/slideLayout9.xml><?xml version="1.0" encoding="utf-8"?>
+<p:sldLayout xmlns:a="http://schemas.openxmlformats.org/drawingml/2006/main" xmlns:r="http://schemas.openxmlformats.org/officeDocument/2006/relationships" xmlns:p="http://schemas.openxmlformats.org/presentationml/2006/main" type="tx">
+  <p:cSld name="Quote">
+    <p:spTree>
+      <p:nvGrpSpPr>
+        <p:cNvPr id="1" name=""/>
+        <p:cNvGrpSpPr/>
+        <p:nvPr/>
+      </p:nvGrpSpPr>
+      <p:grpSpPr>
+        <a:xfrm>
+          <a:off x="0" y="0"/>
+          <a:ext cx="0" cy="0"/>
+          <a:chOff x="0" y="0"/>
+          <a:chExt cx="0" cy="0"/>
+        </a:xfrm>
+      </p:grpSpPr>
+      <p:sp>
+        <p:nvSpPr>
+          <p:cNvPr id="93" name="Shape 93"/>
+          <p:cNvSpPr>
+            <a:spLocks noGrp="1"/>
+          </p:cNvSpPr>
+          <p:nvPr>
+            <p:ph type="body" sz="quarter" idx="13"/>
+          </p:nvPr>
+        </p:nvSpPr>
+        <p:spPr>
+          <a:xfrm>
+            <a:off x="1270000" y="6362700"/>
+            <a:ext cx="10464800" cy="469900"/>
+          </a:xfrm>
+          <a:prstGeom prst="rect">
+            <a:avLst/>
+          </a:prstGeom>
+        </p:spPr>
+        <p:txBody>
+          <a:bodyPr anchor="t">
+            <a:spAutoFit/>
+          </a:bodyPr>
+          <a:lstStyle>
+            <a:lvl1pPr marL="0" indent="0" algn="ctr">
+              <a:spcBef>
+                <a:spcPts val="0"/>
+              </a:spcBef>
+              <a:buSzTx/>
+              <a:buNone/>
+              <a:defRPr sz="2400"/>
+            </a:lvl1pPr>
+          </a:lstStyle>
+          <a:p>
+            <a:r>
+              <a:t>–Johnny Appleseed</a:t>
+            </a:r>
+          </a:p>
+        </p:txBody>
+      </p:sp>
+      <p:sp>
+        <p:nvSpPr>
+          <p:cNvPr id="94" name="Shape 94"/>
+          <p:cNvSpPr>
+            <a:spLocks noGrp="1"/>
+          </p:cNvSpPr>
+          <p:nvPr>
+            <p:ph type="body" sz="quarter" idx="14"/>
+          </p:nvPr>
+        </p:nvSpPr>
+        <p:spPr>
+          <a:xfrm>
+            <a:off x="1270000" y="4267200"/>
+            <a:ext cx="10464800" cy="685800"/>
+          </a:xfrm>
+          <a:prstGeom prst="rect">
+            <a:avLst/>
+          </a:prstGeom>
+        </p:spPr>
+        <p:txBody>
+          <a:bodyPr>
+            <a:spAutoFit/>
+          </a:bodyPr>
+          <a:lstStyle>
+            <a:lvl1pPr marL="0" indent="0" algn="ctr">
+              <a:spcBef>
+                <a:spcPts val="0"/>
+              </a:spcBef>
+              <a:buSzTx/>
+              <a:buNone/>
+              <a:defRPr sz="3800"/>
+            </a:lvl1pPr>
+          </a:lstStyle>
+          <a:p>
+            <a:r>
+              <a:t>“Type a quote here.” </a:t>
+            </a:r>
+          </a:p>
+        </p:txBody>
+      </p:sp>
+      <p:sp>
+        <p:nvSpPr>
+          <p:cNvPr id="95" name="Shape 95"/>
+          <p:cNvSpPr>
+            <a:spLocks noGrp="1"/>
+          </p:cNvSpPr>
+          <p:nvPr>
+            <p:ph type="sldNum" sz="quarter" idx="2"/>
+          </p:nvPr>
+        </p:nvSpPr>
+        <p:spPr>
+          <a:prstGeom prst="rect">
+            <a:avLst/>
+          </a:prstGeom>
+        </p:spPr>
+        <p:txBody>
+          <a:bodyPr/>
+          <a:lstStyle/>
+          <a:p>
+            <a:fld id="{86CB4B4D-7CA3-9044-876B-883B54F8677D}" type="slidenum">
+              <a:t>‹#›</a:t>
+            </a:fld>
+            <a:endParaRPr/>
+          </a:p>
+        </p:txBody>
+      </p:sp>
+    </p:spTree>
+  </p:cSld>
+  <p:clrMapOvr>
+    <a:masterClrMapping/>
+  </p:clrMapOvr>
+  <p:transition spd="med"/>
 </p:sldLayout>
 </file>
 
@@ -1999,6 +2009,7 @@
         <a:solidFill>
           <a:srgbClr val="FFFFFF"/>
         </a:solidFill>
+        <a:effectLst/>
       </p:bgPr>
     </p:bg>
     <p:spTree>
@@ -2018,7 +2029,9 @@
       <p:sp>
         <p:nvSpPr>
           <p:cNvPr id="2" name="Shape 2"/>
-          <p:cNvSpPr/>
+          <p:cNvSpPr>
+            <a:spLocks noGrp="1"/>
+          </p:cNvSpPr>
           <p:nvPr>
             <p:ph type="title"/>
           </p:nvPr>
@@ -2036,17 +2049,16 @@
           </a:ln>
           <a:extLst>
             <a:ext uri="{C572A759-6A51-4108-AA02-DFA0A04FC94B}">
-              <ma14:wrappingTextBoxFlag xmlns:ma14="http://schemas.microsoft.com/office/mac/drawingml/2011/main" val="1"/>
+              <ma14:wrappingTextBoxFlag xmlns:ma14="http://schemas.microsoft.com/office/mac/drawingml/2011/main" xmlns="" val="1"/>
             </a:ext>
           </a:extLst>
         </p:spPr>
         <p:txBody>
           <a:bodyPr lIns="50800" tIns="50800" rIns="50800" bIns="50800" anchor="ctr">
-            <a:normAutofit fontScale="100000" lnSpcReduction="0"/>
+            <a:normAutofit/>
           </a:bodyPr>
           <a:lstStyle/>
           <a:p>
-            <a:pPr/>
             <a:r>
               <a:t>Title Text</a:t>
             </a:r>
@@ -2056,7 +2068,9 @@
       <p:sp>
         <p:nvSpPr>
           <p:cNvPr id="3" name="Shape 3"/>
-          <p:cNvSpPr/>
+          <p:cNvSpPr>
+            <a:spLocks noGrp="1"/>
+          </p:cNvSpPr>
           <p:nvPr>
             <p:ph type="body" idx="1"/>
           </p:nvPr>
@@ -2074,17 +2088,16 @@
           </a:ln>
           <a:extLst>
             <a:ext uri="{C572A759-6A51-4108-AA02-DFA0A04FC94B}">
-              <ma14:wrappingTextBoxFlag xmlns:ma14="http://schemas.microsoft.com/office/mac/drawingml/2011/main" val="1"/>
+              <ma14:wrappingTextBoxFlag xmlns:ma14="http://schemas.microsoft.com/office/mac/drawingml/2011/main" xmlns="" val="1"/>
             </a:ext>
           </a:extLst>
         </p:spPr>
         <p:txBody>
           <a:bodyPr lIns="50800" tIns="50800" rIns="50800" bIns="50800" anchor="ctr">
-            <a:normAutofit fontScale="100000" lnSpcReduction="0"/>
+            <a:normAutofit/>
           </a:bodyPr>
           <a:lstStyle/>
           <a:p>
-            <a:pPr/>
             <a:r>
               <a:t>Body Level One</a:t>
             </a:r>
@@ -2118,7 +2131,9 @@
       <p:sp>
         <p:nvSpPr>
           <p:cNvPr id="4" name="Shape 4"/>
-          <p:cNvSpPr/>
+          <p:cNvSpPr>
+            <a:spLocks noGrp="1"/>
+          </p:cNvSpPr>
           <p:nvPr>
             <p:ph type="sldNum" sz="quarter" idx="2"/>
           </p:nvPr>
@@ -2145,8 +2160,10 @@
             </a:lvl1pPr>
           </a:lstStyle>
           <a:p>
-            <a:pPr/>
-            <a:fld id="{86CB4B4D-7CA3-9044-876B-883B54F8677D}" type="slidenum"/>
+            <a:fld id="{86CB4B4D-7CA3-9044-876B-883B54F8677D}" type="slidenum">
+              <a:t>‹#›</a:t>
+            </a:fld>
+            <a:endParaRPr/>
           </a:p>
         </p:txBody>
       </p:sp>
@@ -2154,20 +2171,19 @@
   </p:cSld>
   <p:clrMap bg1="lt1" tx1="dk1" bg2="lt2" tx2="dk2" accent1="accent1" accent2="accent2" accent3="accent3" accent4="accent4" accent5="accent5" accent6="accent6" hlink="hlink" folHlink="folHlink"/>
   <p:sldLayoutIdLst>
-    <p:sldLayoutId id="2147483649" r:id="rId2"/>
-    <p:sldLayoutId id="2147483650" r:id="rId3"/>
-    <p:sldLayoutId id="2147483651" r:id="rId4"/>
-    <p:sldLayoutId id="2147483652" r:id="rId5"/>
-    <p:sldLayoutId id="2147483653" r:id="rId6"/>
-    <p:sldLayoutId id="2147483654" r:id="rId7"/>
-    <p:sldLayoutId id="2147483655" r:id="rId8"/>
-    <p:sldLayoutId id="2147483656" r:id="rId9"/>
-    <p:sldLayoutId id="2147483657" r:id="rId10"/>
-    <p:sldLayoutId id="2147483658" r:id="rId11"/>
-    <p:sldLayoutId id="2147483659" r:id="rId12"/>
-    <p:sldLayoutId id="2147483660" r:id="rId13"/>
+    <p:sldLayoutId id="2147483649" r:id="rId1"/>
+    <p:sldLayoutId id="2147483650" r:id="rId2"/>
+    <p:sldLayoutId id="2147483651" r:id="rId3"/>
+    <p:sldLayoutId id="2147483652" r:id="rId4"/>
+    <p:sldLayoutId id="2147483654" r:id="rId5"/>
+    <p:sldLayoutId id="2147483655" r:id="rId6"/>
+    <p:sldLayoutId id="2147483656" r:id="rId7"/>
+    <p:sldLayoutId id="2147483657" r:id="rId8"/>
+    <p:sldLayoutId id="2147483658" r:id="rId9"/>
+    <p:sldLayoutId id="2147483659" r:id="rId10"/>
+    <p:sldLayoutId id="2147483660" r:id="rId11"/>
   </p:sldLayoutIdLst>
-  <p:transition xmlns:p14="http://schemas.microsoft.com/office/powerpoint/2010/main" spd="med" advClick="1"/>
+  <p:transition spd="med"/>
   <p:txStyles>
     <p:titleStyle>
       <a:lvl1pPr marL="0" marR="0" indent="0" algn="ctr" defTabSz="584200" rtl="0" latinLnBrk="0">
@@ -2185,7 +2201,7 @@
         <a:buFontTx/>
         <a:buNone/>
         <a:tabLst/>
-        <a:defRPr b="0" baseline="0" cap="none" i="0" spc="0" strike="noStrike" sz="8000" u="none">
+        <a:defRPr sz="8000" b="0" i="0" u="none" strike="noStrike" cap="none" spc="0" baseline="0">
           <a:ln>
             <a:noFill/>
           </a:ln>
@@ -2214,7 +2230,7 @@
         <a:buFontTx/>
         <a:buNone/>
         <a:tabLst/>
-        <a:defRPr b="0" baseline="0" cap="none" i="0" spc="0" strike="noStrike" sz="8000" u="none">
+        <a:defRPr sz="8000" b="0" i="0" u="none" strike="noStrike" cap="none" spc="0" baseline="0">
           <a:ln>
             <a:noFill/>
           </a:ln>
@@ -2243,7 +2259,7 @@
         <a:buFontTx/>
         <a:buNone/>
         <a:tabLst/>
-        <a:defRPr b="0" baseline="0" cap="none" i="0" spc="0" strike="noStrike" sz="8000" u="none">
+        <a:defRPr sz="8000" b="0" i="0" u="none" strike="noStrike" cap="none" spc="0" baseline="0">
           <a:ln>
             <a:noFill/>
           </a:ln>
@@ -2272,7 +2288,7 @@
         <a:buFontTx/>
         <a:buNone/>
         <a:tabLst/>
-        <a:defRPr b="0" baseline="0" cap="none" i="0" spc="0" strike="noStrike" sz="8000" u="none">
+        <a:defRPr sz="8000" b="0" i="0" u="none" strike="noStrike" cap="none" spc="0" baseline="0">
           <a:ln>
             <a:noFill/>
           </a:ln>
@@ -2301,7 +2317,7 @@
         <a:buFontTx/>
         <a:buNone/>
         <a:tabLst/>
-        <a:defRPr b="0" baseline="0" cap="none" i="0" spc="0" strike="noStrike" sz="8000" u="none">
+        <a:defRPr sz="8000" b="0" i="0" u="none" strike="noStrike" cap="none" spc="0" baseline="0">
           <a:ln>
             <a:noFill/>
           </a:ln>
@@ -2330,7 +2346,7 @@
         <a:buFontTx/>
         <a:buNone/>
         <a:tabLst/>
-        <a:defRPr b="0" baseline="0" cap="none" i="0" spc="0" strike="noStrike" sz="8000" u="none">
+        <a:defRPr sz="8000" b="0" i="0" u="none" strike="noStrike" cap="none" spc="0" baseline="0">
           <a:ln>
             <a:noFill/>
           </a:ln>
@@ -2359,7 +2375,7 @@
         <a:buFontTx/>
         <a:buNone/>
         <a:tabLst/>
-        <a:defRPr b="0" baseline="0" cap="none" i="0" spc="0" strike="noStrike" sz="8000" u="none">
+        <a:defRPr sz="8000" b="0" i="0" u="none" strike="noStrike" cap="none" spc="0" baseline="0">
           <a:ln>
             <a:noFill/>
           </a:ln>
@@ -2388,7 +2404,7 @@
         <a:buFontTx/>
         <a:buNone/>
         <a:tabLst/>
-        <a:defRPr b="0" baseline="0" cap="none" i="0" spc="0" strike="noStrike" sz="8000" u="none">
+        <a:defRPr sz="8000" b="0" i="0" u="none" strike="noStrike" cap="none" spc="0" baseline="0">
           <a:ln>
             <a:noFill/>
           </a:ln>
@@ -2417,7 +2433,7 @@
         <a:buFontTx/>
         <a:buNone/>
         <a:tabLst/>
-        <a:defRPr b="0" baseline="0" cap="none" i="0" spc="0" strike="noStrike" sz="8000" u="none">
+        <a:defRPr sz="8000" b="0" i="0" u="none" strike="noStrike" cap="none" spc="0" baseline="0">
           <a:ln>
             <a:noFill/>
           </a:ln>
@@ -2448,7 +2464,7 @@
         <a:buFontTx/>
         <a:buChar char="•"/>
         <a:tabLst/>
-        <a:defRPr b="0" baseline="0" cap="none" i="0" spc="0" strike="noStrike" sz="3600" u="none">
+        <a:defRPr sz="3600" b="0" i="0" u="none" strike="noStrike" cap="none" spc="0" baseline="0">
           <a:ln>
             <a:noFill/>
           </a:ln>
@@ -2477,7 +2493,7 @@
         <a:buFontTx/>
         <a:buChar char="•"/>
         <a:tabLst/>
-        <a:defRPr b="0" baseline="0" cap="none" i="0" spc="0" strike="noStrike" sz="3600" u="none">
+        <a:defRPr sz="3600" b="0" i="0" u="none" strike="noStrike" cap="none" spc="0" baseline="0">
           <a:ln>
             <a:noFill/>
           </a:ln>
@@ -2506,7 +2522,7 @@
         <a:buFontTx/>
         <a:buChar char="•"/>
         <a:tabLst/>
-        <a:defRPr b="0" baseline="0" cap="none" i="0" spc="0" strike="noStrike" sz="3600" u="none">
+        <a:defRPr sz="3600" b="0" i="0" u="none" strike="noStrike" cap="none" spc="0" baseline="0">
           <a:ln>
             <a:noFill/>
           </a:ln>
@@ -2535,7 +2551,7 @@
         <a:buFontTx/>
         <a:buChar char="•"/>
         <a:tabLst/>
-        <a:defRPr b="0" baseline="0" cap="none" i="0" spc="0" strike="noStrike" sz="3600" u="none">
+        <a:defRPr sz="3600" b="0" i="0" u="none" strike="noStrike" cap="none" spc="0" baseline="0">
           <a:ln>
             <a:noFill/>
           </a:ln>
@@ -2564,7 +2580,7 @@
         <a:buFontTx/>
         <a:buChar char="•"/>
         <a:tabLst/>
-        <a:defRPr b="0" baseline="0" cap="none" i="0" spc="0" strike="noStrike" sz="3600" u="none">
+        <a:defRPr sz="3600" b="0" i="0" u="none" strike="noStrike" cap="none" spc="0" baseline="0">
           <a:ln>
             <a:noFill/>
           </a:ln>
@@ -2593,7 +2609,7 @@
         <a:buFontTx/>
         <a:buChar char="•"/>
         <a:tabLst/>
-        <a:defRPr b="0" baseline="0" cap="none" i="0" spc="0" strike="noStrike" sz="3600" u="none">
+        <a:defRPr sz="3600" b="0" i="0" u="none" strike="noStrike" cap="none" spc="0" baseline="0">
           <a:ln>
             <a:noFill/>
           </a:ln>
@@ -2622,7 +2638,7 @@
         <a:buFontTx/>
         <a:buChar char="•"/>
         <a:tabLst/>
-        <a:defRPr b="0" baseline="0" cap="none" i="0" spc="0" strike="noStrike" sz="3600" u="none">
+        <a:defRPr sz="3600" b="0" i="0" u="none" strike="noStrike" cap="none" spc="0" baseline="0">
           <a:ln>
             <a:noFill/>
           </a:ln>
@@ -2651,7 +2667,7 @@
         <a:buFontTx/>
         <a:buChar char="•"/>
         <a:tabLst/>
-        <a:defRPr b="0" baseline="0" cap="none" i="0" spc="0" strike="noStrike" sz="3600" u="none">
+        <a:defRPr sz="3600" b="0" i="0" u="none" strike="noStrike" cap="none" spc="0" baseline="0">
           <a:ln>
             <a:noFill/>
           </a:ln>
@@ -2680,7 +2696,7 @@
         <a:buFontTx/>
         <a:buChar char="•"/>
         <a:tabLst/>
-        <a:defRPr b="0" baseline="0" cap="none" i="0" spc="0" strike="noStrike" sz="3600" u="none">
+        <a:defRPr sz="3600" b="0" i="0" u="none" strike="noStrike" cap="none" spc="0" baseline="0">
           <a:ln>
             <a:noFill/>
           </a:ln>
@@ -2711,7 +2727,7 @@
         <a:buFontTx/>
         <a:buNone/>
         <a:tabLst/>
-        <a:defRPr b="0" baseline="0" cap="none" i="0" spc="0" strike="noStrike" sz="1800" u="none">
+        <a:defRPr sz="1800" b="0" i="0" u="none" strike="noStrike" cap="none" spc="0" baseline="0">
           <a:ln>
             <a:noFill/>
           </a:ln>
@@ -2740,7 +2756,7 @@
         <a:buFontTx/>
         <a:buNone/>
         <a:tabLst/>
-        <a:defRPr b="0" baseline="0" cap="none" i="0" spc="0" strike="noStrike" sz="1800" u="none">
+        <a:defRPr sz="1800" b="0" i="0" u="none" strike="noStrike" cap="none" spc="0" baseline="0">
           <a:ln>
             <a:noFill/>
           </a:ln>
@@ -2769,7 +2785,7 @@
         <a:buFontTx/>
         <a:buNone/>
         <a:tabLst/>
-        <a:defRPr b="0" baseline="0" cap="none" i="0" spc="0" strike="noStrike" sz="1800" u="none">
+        <a:defRPr sz="1800" b="0" i="0" u="none" strike="noStrike" cap="none" spc="0" baseline="0">
           <a:ln>
             <a:noFill/>
           </a:ln>
@@ -2798,7 +2814,7 @@
         <a:buFontTx/>
         <a:buNone/>
         <a:tabLst/>
-        <a:defRPr b="0" baseline="0" cap="none" i="0" spc="0" strike="noStrike" sz="1800" u="none">
+        <a:defRPr sz="1800" b="0" i="0" u="none" strike="noStrike" cap="none" spc="0" baseline="0">
           <a:ln>
             <a:noFill/>
           </a:ln>
@@ -2827,7 +2843,7 @@
         <a:buFontTx/>
         <a:buNone/>
         <a:tabLst/>
-        <a:defRPr b="0" baseline="0" cap="none" i="0" spc="0" strike="noStrike" sz="1800" u="none">
+        <a:defRPr sz="1800" b="0" i="0" u="none" strike="noStrike" cap="none" spc="0" baseline="0">
           <a:ln>
             <a:noFill/>
           </a:ln>
@@ -2856,7 +2872,7 @@
         <a:buFontTx/>
         <a:buNone/>
         <a:tabLst/>
-        <a:defRPr b="0" baseline="0" cap="none" i="0" spc="0" strike="noStrike" sz="1800" u="none">
+        <a:defRPr sz="1800" b="0" i="0" u="none" strike="noStrike" cap="none" spc="0" baseline="0">
           <a:ln>
             <a:noFill/>
           </a:ln>
@@ -2885,7 +2901,7 @@
         <a:buFontTx/>
         <a:buNone/>
         <a:tabLst/>
-        <a:defRPr b="0" baseline="0" cap="none" i="0" spc="0" strike="noStrike" sz="1800" u="none">
+        <a:defRPr sz="1800" b="0" i="0" u="none" strike="noStrike" cap="none" spc="0" baseline="0">
           <a:ln>
             <a:noFill/>
           </a:ln>
@@ -2914,7 +2930,7 @@
         <a:buFontTx/>
         <a:buNone/>
         <a:tabLst/>
-        <a:defRPr b="0" baseline="0" cap="none" i="0" spc="0" strike="noStrike" sz="1800" u="none">
+        <a:defRPr sz="1800" b="0" i="0" u="none" strike="noStrike" cap="none" spc="0" baseline="0">
           <a:ln>
             <a:noFill/>
           </a:ln>
@@ -2943,7 +2959,7 @@
         <a:buFontTx/>
         <a:buNone/>
         <a:tabLst/>
-        <a:defRPr b="0" baseline="0" cap="none" i="0" spc="0" strike="noStrike" sz="1800" u="none">
+        <a:defRPr sz="1800" b="0" i="0" u="none" strike="noStrike" cap="none" spc="0" baseline="0">
           <a:ln>
             <a:noFill/>
           </a:ln>
@@ -2963,7 +2979,7 @@
 </file>
 
 <file path=ppt/slides/slide1.xml><?xml version="1.0" encoding="utf-8"?>
-<p:sld xmlns:a="http://schemas.openxmlformats.org/drawingml/2006/main" xmlns:r="http://schemas.openxmlformats.org/officeDocument/2006/relationships" xmlns:p="http://schemas.openxmlformats.org/presentationml/2006/main" showMasterSp="1" showMasterPhAnim="1">
+<p:sld xmlns:a="http://schemas.openxmlformats.org/drawingml/2006/main" xmlns:r="http://schemas.openxmlformats.org/officeDocument/2006/relationships" xmlns:p="http://schemas.openxmlformats.org/presentationml/2006/main">
   <p:cSld>
     <p:spTree>
       <p:nvGrpSpPr>
@@ -2982,7 +2998,9 @@
       <p:sp>
         <p:nvSpPr>
           <p:cNvPr id="119" name="Shape 119"/>
-          <p:cNvSpPr/>
+          <p:cNvSpPr>
+            <a:spLocks noGrp="1"/>
+          </p:cNvSpPr>
           <p:nvPr>
             <p:ph type="ctrTitle"/>
           </p:nvPr>
@@ -2996,7 +3014,6 @@
           <a:bodyPr/>
           <a:lstStyle/>
           <a:p>
-            <a:pPr/>
             <a:r>
               <a:t>Java Advanced</a:t>
             </a:r>
@@ -3006,7 +3023,9 @@
       <p:sp>
         <p:nvSpPr>
           <p:cNvPr id="120" name="Shape 120"/>
-          <p:cNvSpPr/>
+          <p:cNvSpPr>
+            <a:spLocks noGrp="1"/>
+          </p:cNvSpPr>
           <p:nvPr>
             <p:ph type="subTitle" sz="quarter" idx="1"/>
           </p:nvPr>
@@ -3036,12 +3055,12 @@
   <p:clrMapOvr>
     <a:masterClrMapping/>
   </p:clrMapOvr>
-  <p:transition xmlns:p14="http://schemas.microsoft.com/office/powerpoint/2010/main" spd="med" advClick="1"/>
+  <p:transition spd="med"/>
 </p:sld>
 </file>
 
 <file path=ppt/slides/slide2.xml><?xml version="1.0" encoding="utf-8"?>
-<p:sld xmlns:a="http://schemas.openxmlformats.org/drawingml/2006/main" xmlns:r="http://schemas.openxmlformats.org/officeDocument/2006/relationships" xmlns:p="http://schemas.openxmlformats.org/presentationml/2006/main" showMasterSp="1" showMasterPhAnim="1">
+<p:sld xmlns:a="http://schemas.openxmlformats.org/drawingml/2006/main" xmlns:r="http://schemas.openxmlformats.org/officeDocument/2006/relationships" xmlns:p="http://schemas.openxmlformats.org/presentationml/2006/main">
   <p:cSld>
     <p:spTree>
       <p:nvGrpSpPr>
@@ -3059,39 +3078,136 @@
       </p:grpSpPr>
       <p:sp>
         <p:nvSpPr>
-          <p:cNvPr id="122" name="Shape 122"/>
-          <p:cNvSpPr/>
+          <p:cNvPr id="2" name="Title 1"/>
+          <p:cNvSpPr>
+            <a:spLocks noGrp="1"/>
+          </p:cNvSpPr>
           <p:nvPr>
             <p:ph type="title"/>
           </p:nvPr>
         </p:nvSpPr>
-        <p:spPr>
-          <a:prstGeom prst="rect">
-            <a:avLst/>
-          </a:prstGeom>
-        </p:spPr>
+        <p:spPr/>
         <p:txBody>
           <a:bodyPr/>
           <a:lstStyle/>
           <a:p>
-            <a:pPr/>
-            <a:r>
-              <a:t>Peter Manolov</a:t>
-            </a:r>
+            <a:r>
+              <a:rPr lang="en-US" dirty="0" smtClean="0"/>
+              <a:t>Peter </a:t>
+            </a:r>
+            <a:r>
+              <a:rPr lang="en-US" dirty="0" err="1" smtClean="0"/>
+              <a:t>Manolov</a:t>
+            </a:r>
+            <a:endParaRPr lang="en-US" dirty="0"/>
+          </a:p>
+        </p:txBody>
+      </p:sp>
+      <p:sp>
+        <p:nvSpPr>
+          <p:cNvPr id="3" name="Text Placeholder 2"/>
+          <p:cNvSpPr>
+            <a:spLocks noGrp="1"/>
+          </p:cNvSpPr>
+          <p:nvPr>
+            <p:ph type="body" idx="1"/>
+          </p:nvPr>
+        </p:nvSpPr>
+        <p:spPr/>
+        <p:txBody>
+          <a:bodyPr>
+            <a:normAutofit fontScale="77500" lnSpcReduction="20000"/>
+          </a:bodyPr>
+          <a:lstStyle/>
+          <a:p>
+            <a:endParaRPr lang="en-US" dirty="0" smtClean="0"/>
+          </a:p>
+          <a:p>
+            <a:r>
+              <a:rPr lang="en-US" dirty="0" smtClean="0"/>
+              <a:t>Graduated TU – Sofia</a:t>
+            </a:r>
+          </a:p>
+          <a:p>
+            <a:r>
+              <a:rPr lang="en-US" dirty="0" smtClean="0"/>
+              <a:t>Worked in many companies – MF Solutions, </a:t>
+            </a:r>
+            <a:r>
+              <a:rPr lang="en-US" dirty="0" err="1" smtClean="0"/>
+              <a:t>ProxiAD</a:t>
+            </a:r>
+            <a:r>
+              <a:rPr lang="en-US" dirty="0" smtClean="0"/>
+              <a:t>, Javelin, </a:t>
+            </a:r>
+            <a:r>
+              <a:rPr lang="en-US" dirty="0" err="1" smtClean="0"/>
+              <a:t>DevelopSoft</a:t>
+            </a:r>
+            <a:r>
+              <a:rPr lang="en-US" dirty="0" smtClean="0"/>
+              <a:t>. </a:t>
+            </a:r>
+          </a:p>
+          <a:p>
+            <a:r>
+              <a:rPr lang="en-US" dirty="0" smtClean="0"/>
+              <a:t>Experiences include – IDE development, CRM Systems, E-Commerce platforms , </a:t>
+            </a:r>
+            <a:r>
+              <a:rPr lang="en-US" dirty="0" err="1" smtClean="0"/>
+              <a:t>BigData</a:t>
+            </a:r>
+            <a:r>
+              <a:rPr lang="en-US" dirty="0" smtClean="0"/>
+              <a:t> Solutions using different enterprise technologies and languages.</a:t>
+            </a:r>
+          </a:p>
+          <a:p>
+            <a:r>
+              <a:rPr lang="en-US" dirty="0" smtClean="0"/>
+              <a:t>Senior trainer here @ Pragmatic. Developed the Java Basic Course and Java Advanced Courses</a:t>
+            </a:r>
+          </a:p>
+          <a:p>
+            <a:r>
+              <a:rPr lang="en-US" dirty="0"/>
+              <a:t>Currently CTO of </a:t>
+            </a:r>
+            <a:r>
+              <a:rPr lang="en-US" dirty="0" err="1"/>
+              <a:t>GoGoFish</a:t>
+            </a:r>
+            <a:r>
+              <a:rPr lang="en-US" dirty="0"/>
+              <a:t> </a:t>
+            </a:r>
+          </a:p>
+          <a:p>
+            <a:pPr marL="0" indent="0">
+              <a:buNone/>
+            </a:pPr>
+            <a:endParaRPr lang="en-US" dirty="0"/>
           </a:p>
         </p:txBody>
       </p:sp>
     </p:spTree>
+    <p:extLst>
+      <p:ext uri="{BB962C8B-B14F-4D97-AF65-F5344CB8AC3E}">
+        <p14:creationId xmlns:p14="http://schemas.microsoft.com/office/powerpoint/2010/main" val="1972035489"/>
+      </p:ext>
+    </p:extLst>
   </p:cSld>
   <p:clrMapOvr>
     <a:masterClrMapping/>
   </p:clrMapOvr>
-  <p:transition xmlns:p14="http://schemas.microsoft.com/office/powerpoint/2010/main" spd="med" advClick="1" p14:dur="1000"/>
+  <p:transition spd="med"/>
 </p:sld>
 </file>
 
 <file path=ppt/slides/slide3.xml><?xml version="1.0" encoding="utf-8"?>
-<p:sld xmlns:a="http://schemas.openxmlformats.org/drawingml/2006/main" xmlns:r="http://schemas.openxmlformats.org/officeDocument/2006/relationships" xmlns:p="http://schemas.openxmlformats.org/presentationml/2006/main" showMasterSp="1" showMasterPhAnim="1">
+<p:sld xmlns:a="http://schemas.openxmlformats.org/drawingml/2006/main" xmlns:r="http://schemas.openxmlformats.org/officeDocument/2006/relationships" xmlns:p="http://schemas.openxmlformats.org/presentationml/2006/main">
   <p:cSld>
     <p:spTree>
       <p:nvGrpSpPr>
@@ -3110,7 +3226,9 @@
       <p:sp>
         <p:nvSpPr>
           <p:cNvPr id="124" name="Shape 124"/>
-          <p:cNvSpPr/>
+          <p:cNvSpPr>
+            <a:spLocks noGrp="1"/>
+          </p:cNvSpPr>
           <p:nvPr>
             <p:ph type="title"/>
           </p:nvPr>
@@ -3124,7 +3242,6 @@
           <a:bodyPr/>
           <a:lstStyle/>
           <a:p>
-            <a:pPr/>
             <a:r>
               <a:t>Nayden Gochev</a:t>
             </a:r>
@@ -3134,7 +3251,9 @@
       <p:sp>
         <p:nvSpPr>
           <p:cNvPr id="125" name="Shape 125"/>
-          <p:cNvSpPr/>
+          <p:cNvSpPr>
+            <a:spLocks noGrp="1"/>
+          </p:cNvSpPr>
           <p:nvPr>
             <p:ph type="body" idx="1"/>
           </p:nvPr>
@@ -3145,7 +3264,9 @@
           </a:prstGeom>
         </p:spPr>
         <p:txBody>
-          <a:bodyPr/>
+          <a:bodyPr>
+            <a:normAutofit lnSpcReduction="10000"/>
+          </a:bodyPr>
           <a:lstStyle/>
           <a:p>
             <a:pPr marL="342264" indent="-342264" defTabSz="449833">
@@ -3155,6 +3276,7 @@
               <a:defRPr sz="2772"/>
             </a:pPr>
             <a:r>
+              <a:rPr dirty="0"/>
               <a:t>Graduated Plovdiv University in 2007</a:t>
             </a:r>
           </a:p>
@@ -3166,8 +3288,30 @@
               <a:defRPr sz="2772"/>
             </a:pPr>
             <a:r>
-              <a:t>Worked in multiple companies as Java Developer: Isy Intellect, ProxiAD, Insight Technologies, Phamola</a:t>
-            </a:r>
+              <a:rPr dirty="0"/>
+              <a:t>Worked in multiple companies as Java Developer: </a:t>
+            </a:r>
+            <a:r>
+              <a:rPr dirty="0" err="1"/>
+              <a:t>Isy</a:t>
+            </a:r>
+            <a:r>
+              <a:rPr dirty="0"/>
+              <a:t> Intellect, </a:t>
+            </a:r>
+            <a:r>
+              <a:rPr dirty="0" err="1"/>
+              <a:t>ProxiAD</a:t>
+            </a:r>
+            <a:r>
+              <a:rPr dirty="0"/>
+              <a:t>, Insight Technologies, </a:t>
+            </a:r>
+            <a:r>
+              <a:rPr dirty="0" err="1"/>
+              <a:t>Phamola</a:t>
+            </a:r>
+            <a:endParaRPr dirty="0"/>
           </a:p>
           <a:p>
             <a:pPr marL="342264" indent="-342264" defTabSz="449833">
@@ -3177,8 +3321,14 @@
               <a:defRPr sz="2772"/>
             </a:pPr>
             <a:r>
-              <a:t>Worked as Team Lead at Telerik</a:t>
-            </a:r>
+              <a:rPr dirty="0"/>
+              <a:t>Worked as Team Lead at </a:t>
+            </a:r>
+            <a:r>
+              <a:rPr dirty="0" err="1"/>
+              <a:t>Telerik</a:t>
+            </a:r>
+            <a:endParaRPr dirty="0"/>
           </a:p>
           <a:p>
             <a:pPr marL="342264" indent="-342264" defTabSz="449833">
@@ -3188,15 +3338,17 @@
               <a:defRPr sz="2772"/>
             </a:pPr>
             <a:r>
+              <a:rPr dirty="0"/>
               <a:t>Trainer at Pragmatic since 2014, before that was trainer at NARS and Plovdiv University, held multiple lectures (some recordings are available at </a:t>
             </a:r>
             <a:r>
-              <a:rPr u="sng">
-                <a:hlinkClick r:id="rId2" invalidUrl="" action="" tgtFrame="" tooltip="" history="1" highlightClick="0" endSnd="0"/>
+              <a:rPr u="sng" dirty="0">
+                <a:hlinkClick r:id="rId2"/>
               </a:rPr>
               <a:t>http://gochev.org</a:t>
             </a:r>
             <a:r>
+              <a:rPr dirty="0"/>
               <a:t> )</a:t>
             </a:r>
           </a:p>
@@ -3208,10 +3360,14 @@
               <a:defRPr sz="2772"/>
             </a:pPr>
             <a:r>
+              <a:rPr dirty="0"/>
               <a:t>Member of board of directors at Bulgarian Java User Group </a:t>
             </a:r>
-            <a:br/>
-            <a:r>
+            <a:br>
+              <a:rPr dirty="0"/>
+            </a:br>
+            <a:r>
+              <a:rPr dirty="0"/>
               <a:t>(http://jug.bg)</a:t>
             </a:r>
           </a:p>
@@ -3223,15 +3379,17 @@
               <a:defRPr sz="2772"/>
             </a:pPr>
             <a:r>
+              <a:rPr dirty="0"/>
               <a:t>Works as architect at Nemesis Software (</a:t>
             </a:r>
             <a:r>
-              <a:rPr u="sng">
-                <a:hlinkClick r:id="rId3" invalidUrl="" action="" tgtFrame="" tooltip="" history="1" highlightClick="0" endSnd="0"/>
+              <a:rPr u="sng" dirty="0">
+                <a:hlinkClick r:id="rId3"/>
               </a:rPr>
               <a:t>nemesis.io</a:t>
             </a:r>
             <a:r>
+              <a:rPr dirty="0"/>
               <a:t>)</a:t>
             </a:r>
           </a:p>
@@ -3242,12 +3400,12 @@
   <p:clrMapOvr>
     <a:masterClrMapping/>
   </p:clrMapOvr>
-  <p:transition xmlns:p14="http://schemas.microsoft.com/office/powerpoint/2010/main" spd="med" advClick="1" p14:dur="1000"/>
+  <p:transition spd="slow"/>
 </p:sld>
 </file>
 
 <file path=ppt/slides/slide4.xml><?xml version="1.0" encoding="utf-8"?>
-<p:sld xmlns:a="http://schemas.openxmlformats.org/drawingml/2006/main" xmlns:r="http://schemas.openxmlformats.org/officeDocument/2006/relationships" xmlns:p="http://schemas.openxmlformats.org/presentationml/2006/main" showMasterSp="1" showMasterPhAnim="1">
+<p:sld xmlns:a="http://schemas.openxmlformats.org/drawingml/2006/main" xmlns:r="http://schemas.openxmlformats.org/officeDocument/2006/relationships" xmlns:p="http://schemas.openxmlformats.org/presentationml/2006/main">
   <p:cSld>
     <p:spTree>
       <p:nvGrpSpPr>
@@ -3266,7 +3424,9 @@
       <p:sp>
         <p:nvSpPr>
           <p:cNvPr id="127" name="Shape 127"/>
-          <p:cNvSpPr/>
+          <p:cNvSpPr>
+            <a:spLocks noGrp="1"/>
+          </p:cNvSpPr>
           <p:nvPr>
             <p:ph type="title"/>
           </p:nvPr>
@@ -3284,7 +3444,6 @@
           <a:bodyPr/>
           <a:lstStyle/>
           <a:p>
-            <a:pPr/>
             <a:r>
               <a:t>Agenda</a:t>
             </a:r>
@@ -3294,7 +3453,9 @@
       <p:sp>
         <p:nvSpPr>
           <p:cNvPr id="128" name="Shape 128"/>
-          <p:cNvSpPr/>
+          <p:cNvSpPr>
+            <a:spLocks noGrp="1"/>
+          </p:cNvSpPr>
           <p:nvPr>
             <p:ph type="body" idx="1"/>
           </p:nvPr>
@@ -3309,14 +3470,16 @@
           </a:prstGeom>
         </p:spPr>
         <p:txBody>
-          <a:bodyPr/>
+          <a:bodyPr>
+            <a:normAutofit lnSpcReduction="10000"/>
+          </a:bodyPr>
           <a:lstStyle/>
           <a:p>
             <a:pPr marL="191134" indent="-191134" defTabSz="251206">
               <a:spcBef>
                 <a:spcPts val="1800"/>
               </a:spcBef>
-              <a:defRPr b="1" sz="1935">
+              <a:defRPr sz="1935" b="1">
                 <a:latin typeface="Helvetica"/>
                 <a:ea typeface="Helvetica"/>
                 <a:cs typeface="Helvetica"/>
@@ -3332,7 +3495,7 @@
               <a:spcBef>
                 <a:spcPts val="1800"/>
               </a:spcBef>
-              <a:defRPr b="1" sz="1935">
+              <a:defRPr sz="1935" b="1">
                 <a:latin typeface="Helvetica"/>
                 <a:ea typeface="Helvetica"/>
                 <a:cs typeface="Helvetica"/>
@@ -3348,7 +3511,7 @@
               <a:spcBef>
                 <a:spcPts val="1800"/>
               </a:spcBef>
-              <a:defRPr b="1" sz="1935">
+              <a:defRPr sz="1935" b="1">
                 <a:latin typeface="Helvetica"/>
                 <a:ea typeface="Helvetica"/>
                 <a:cs typeface="Helvetica"/>
@@ -3364,7 +3527,7 @@
               <a:spcBef>
                 <a:spcPts val="1800"/>
               </a:spcBef>
-              <a:defRPr b="1" sz="1935">
+              <a:defRPr sz="1935" b="1">
                 <a:latin typeface="Helvetica"/>
                 <a:ea typeface="Helvetica"/>
                 <a:cs typeface="Helvetica"/>
@@ -3380,7 +3543,7 @@
               <a:spcBef>
                 <a:spcPts val="1800"/>
               </a:spcBef>
-              <a:defRPr b="1" sz="1935">
+              <a:defRPr sz="1935" b="1">
                 <a:latin typeface="Helvetica"/>
                 <a:ea typeface="Helvetica"/>
                 <a:cs typeface="Helvetica"/>
@@ -3396,7 +3559,7 @@
               <a:spcBef>
                 <a:spcPts val="1800"/>
               </a:spcBef>
-              <a:defRPr b="1" sz="1935">
+              <a:defRPr sz="1935" b="1">
                 <a:latin typeface="Helvetica"/>
                 <a:ea typeface="Helvetica"/>
                 <a:cs typeface="Helvetica"/>
@@ -3412,7 +3575,7 @@
               <a:spcBef>
                 <a:spcPts val="1800"/>
               </a:spcBef>
-              <a:defRPr b="1" sz="1935">
+              <a:defRPr sz="1935" b="1">
                 <a:latin typeface="Helvetica"/>
                 <a:ea typeface="Helvetica"/>
                 <a:cs typeface="Helvetica"/>
@@ -3428,7 +3591,7 @@
               <a:spcBef>
                 <a:spcPts val="1800"/>
               </a:spcBef>
-              <a:defRPr b="1" sz="1935">
+              <a:defRPr sz="1935" b="1">
                 <a:latin typeface="Helvetica"/>
                 <a:ea typeface="Helvetica"/>
                 <a:cs typeface="Helvetica"/>
@@ -3444,7 +3607,7 @@
               <a:spcBef>
                 <a:spcPts val="1800"/>
               </a:spcBef>
-              <a:defRPr b="1" sz="1935">
+              <a:defRPr sz="1935" b="1">
                 <a:latin typeface="Helvetica"/>
                 <a:ea typeface="Helvetica"/>
                 <a:cs typeface="Helvetica"/>
@@ -3460,7 +3623,7 @@
               <a:spcBef>
                 <a:spcPts val="1800"/>
               </a:spcBef>
-              <a:defRPr b="1" sz="1935">
+              <a:defRPr sz="1935" b="1">
                 <a:latin typeface="Helvetica"/>
                 <a:ea typeface="Helvetica"/>
                 <a:cs typeface="Helvetica"/>
@@ -3476,7 +3639,7 @@
               <a:spcBef>
                 <a:spcPts val="1800"/>
               </a:spcBef>
-              <a:defRPr b="1" sz="1935">
+              <a:defRPr sz="1935" b="1">
                 <a:latin typeface="Helvetica"/>
                 <a:ea typeface="Helvetica"/>
                 <a:cs typeface="Helvetica"/>
@@ -3492,7 +3655,7 @@
               <a:spcBef>
                 <a:spcPts val="1800"/>
               </a:spcBef>
-              <a:defRPr b="1" sz="1935">
+              <a:defRPr sz="1935" b="1">
                 <a:latin typeface="Helvetica"/>
                 <a:ea typeface="Helvetica"/>
                 <a:cs typeface="Helvetica"/>
@@ -3508,7 +3671,7 @@
               <a:spcBef>
                 <a:spcPts val="1800"/>
               </a:spcBef>
-              <a:defRPr b="1" sz="1935">
+              <a:defRPr sz="1935" b="1">
                 <a:latin typeface="Helvetica"/>
                 <a:ea typeface="Helvetica"/>
                 <a:cs typeface="Helvetica"/>
@@ -3524,7 +3687,7 @@
               <a:spcBef>
                 <a:spcPts val="1800"/>
               </a:spcBef>
-              <a:defRPr b="1" sz="1935">
+              <a:defRPr sz="1935" b="1">
                 <a:latin typeface="Helvetica"/>
                 <a:ea typeface="Helvetica"/>
                 <a:cs typeface="Helvetica"/>
@@ -3540,7 +3703,7 @@
               <a:spcBef>
                 <a:spcPts val="1800"/>
               </a:spcBef>
-              <a:defRPr b="1" sz="1935">
+              <a:defRPr sz="1935" b="1">
                 <a:latin typeface="Helvetica"/>
                 <a:ea typeface="Helvetica"/>
                 <a:cs typeface="Helvetica"/>
@@ -3558,12 +3721,12 @@
   <p:clrMapOvr>
     <a:masterClrMapping/>
   </p:clrMapOvr>
-  <p:transition xmlns:p14="http://schemas.microsoft.com/office/powerpoint/2010/main" spd="med" advClick="1" p14:dur="1000"/>
+  <p:transition spd="slow"/>
 </p:sld>
 </file>
 
 <file path=ppt/theme/theme1.xml><?xml version="1.0" encoding="utf-8"?>
-<a:theme xmlns:a="http://schemas.openxmlformats.org/drawingml/2006/main" xmlns:r="http://schemas.openxmlformats.org/officeDocument/2006/relationships" name="White">
+<a:theme xmlns:a="http://schemas.openxmlformats.org/drawingml/2006/main" name="White">
   <a:themeElements>
     <a:clrScheme name="White">
       <a:dk1>
@@ -3689,7 +3852,7 @@
       <a:effectStyleLst>
         <a:effectStyle>
           <a:effectLst>
-            <a:outerShdw sx="100000" sy="100000" kx="0" ky="0" algn="b" rotWithShape="0" blurRad="38100" dist="25400" dir="5400000">
+            <a:outerShdw blurRad="38100" dist="25400" dir="5400000" rotWithShape="0">
               <a:srgbClr val="000000">
                 <a:alpha val="50000"/>
               </a:srgbClr>
@@ -3698,7 +3861,7 @@
         </a:effectStyle>
         <a:effectStyle>
           <a:effectLst>
-            <a:outerShdw sx="100000" sy="100000" kx="0" ky="0" algn="b" rotWithShape="0" blurRad="50800" dist="12700" dir="0">
+            <a:outerShdw blurRad="50800" dist="12700" rotWithShape="0">
               <a:srgbClr val="000000">
                 <a:alpha val="50000"/>
               </a:srgbClr>
@@ -3707,7 +3870,7 @@
         </a:effectStyle>
         <a:effectStyle>
           <a:effectLst>
-            <a:outerShdw sx="100000" sy="100000" kx="0" ky="0" algn="b" rotWithShape="0" blurRad="38100" dist="25400" dir="5400000">
+            <a:outerShdw blurRad="38100" dist="25400" dir="5400000" rotWithShape="0">
               <a:srgbClr val="000000">
                 <a:alpha val="50000"/>
               </a:srgbClr>
@@ -3771,8 +3934,8 @@
     <a:spDef>
       <a:spPr>
         <a:blipFill rotWithShape="1">
-          <a:blip r:embed="rId1"/>
-          <a:srcRect l="0" t="0" r="0" b="0"/>
+          <a:blip xmlns:r="http://schemas.openxmlformats.org/officeDocument/2006/relationships" r:embed="rId1"/>
+          <a:srcRect/>
           <a:tile tx="0" ty="0" sx="100000" sy="100000" flip="none" algn="tl"/>
         </a:blipFill>
         <a:ln w="12700" cap="flat">
@@ -3780,7 +3943,7 @@
           <a:miter lim="400000"/>
         </a:ln>
         <a:effectLst>
-          <a:outerShdw sx="100000" sy="100000" kx="0" ky="0" algn="b" rotWithShape="0" blurRad="38100" dist="25400" dir="5400000">
+          <a:outerShdw blurRad="38100" dist="25400" dir="5400000" rotWithShape="0">
             <a:srgbClr val="000000">
               <a:alpha val="50000"/>
             </a:srgbClr>
@@ -3788,7 +3951,7 @@
         </a:effectLst>
         <a:sp3d/>
       </a:spPr>
-      <a:bodyPr rot="0" spcFirstLastPara="1" vertOverflow="overflow" horzOverflow="overflow" vert="horz" wrap="square" lIns="50800" tIns="50800" rIns="50800" bIns="50800" numCol="1" spcCol="38100" rtlCol="0" anchor="ctr" upright="0">
+      <a:bodyPr rot="0" spcFirstLastPara="1" vertOverflow="overflow" horzOverflow="overflow" vert="horz" wrap="square" lIns="50800" tIns="50800" rIns="50800" bIns="50800" numCol="1" spcCol="38100" rtlCol="0" anchor="ctr">
         <a:spAutoFit/>
       </a:bodyPr>
       <a:lstStyle>
@@ -3807,7 +3970,7 @@
           <a:buFontTx/>
           <a:buNone/>
           <a:tabLst/>
-          <a:defRPr b="0" baseline="0" cap="none" i="0" spc="0" strike="noStrike" sz="2400" u="none" kumimoji="0" normalizeH="0">
+          <a:defRPr kumimoji="0" sz="2400" b="0" i="0" u="none" strike="noStrike" cap="none" spc="0" normalizeH="0" baseline="0">
             <a:ln>
               <a:noFill/>
             </a:ln>
@@ -3837,7 +4000,7 @@
           <a:buFontTx/>
           <a:buNone/>
           <a:tabLst/>
-          <a:defRPr b="0" baseline="0" cap="none" i="0" spc="0" strike="noStrike" sz="1800" u="none" kumimoji="0" normalizeH="0">
+          <a:defRPr kumimoji="0" sz="1800" b="0" i="0" u="none" strike="noStrike" cap="none" spc="0" normalizeH="0" baseline="0">
             <a:ln>
               <a:noFill/>
             </a:ln>
@@ -3863,7 +4026,7 @@
           <a:buFontTx/>
           <a:buNone/>
           <a:tabLst/>
-          <a:defRPr b="0" baseline="0" cap="none" i="0" spc="0" strike="noStrike" sz="1800" u="none" kumimoji="0" normalizeH="0">
+          <a:defRPr kumimoji="0" sz="1800" b="0" i="0" u="none" strike="noStrike" cap="none" spc="0" normalizeH="0" baseline="0">
             <a:ln>
               <a:noFill/>
             </a:ln>
@@ -3889,7 +4052,7 @@
           <a:buFontTx/>
           <a:buNone/>
           <a:tabLst/>
-          <a:defRPr b="0" baseline="0" cap="none" i="0" spc="0" strike="noStrike" sz="1800" u="none" kumimoji="0" normalizeH="0">
+          <a:defRPr kumimoji="0" sz="1800" b="0" i="0" u="none" strike="noStrike" cap="none" spc="0" normalizeH="0" baseline="0">
             <a:ln>
               <a:noFill/>
             </a:ln>
@@ -3915,7 +4078,7 @@
           <a:buFontTx/>
           <a:buNone/>
           <a:tabLst/>
-          <a:defRPr b="0" baseline="0" cap="none" i="0" spc="0" strike="noStrike" sz="1800" u="none" kumimoji="0" normalizeH="0">
+          <a:defRPr kumimoji="0" sz="1800" b="0" i="0" u="none" strike="noStrike" cap="none" spc="0" normalizeH="0" baseline="0">
             <a:ln>
               <a:noFill/>
             </a:ln>
@@ -3941,7 +4104,7 @@
           <a:buFontTx/>
           <a:buNone/>
           <a:tabLst/>
-          <a:defRPr b="0" baseline="0" cap="none" i="0" spc="0" strike="noStrike" sz="1800" u="none" kumimoji="0" normalizeH="0">
+          <a:defRPr kumimoji="0" sz="1800" b="0" i="0" u="none" strike="noStrike" cap="none" spc="0" normalizeH="0" baseline="0">
             <a:ln>
               <a:noFill/>
             </a:ln>
@@ -3967,7 +4130,7 @@
           <a:buFontTx/>
           <a:buNone/>
           <a:tabLst/>
-          <a:defRPr b="0" baseline="0" cap="none" i="0" spc="0" strike="noStrike" sz="1800" u="none" kumimoji="0" normalizeH="0">
+          <a:defRPr kumimoji="0" sz="1800" b="0" i="0" u="none" strike="noStrike" cap="none" spc="0" normalizeH="0" baseline="0">
             <a:ln>
               <a:noFill/>
             </a:ln>
@@ -3993,7 +4156,7 @@
           <a:buFontTx/>
           <a:buNone/>
           <a:tabLst/>
-          <a:defRPr b="0" baseline="0" cap="none" i="0" spc="0" strike="noStrike" sz="1800" u="none" kumimoji="0" normalizeH="0">
+          <a:defRPr kumimoji="0" sz="1800" b="0" i="0" u="none" strike="noStrike" cap="none" spc="0" normalizeH="0" baseline="0">
             <a:ln>
               <a:noFill/>
             </a:ln>
@@ -4019,7 +4182,7 @@
           <a:buFontTx/>
           <a:buNone/>
           <a:tabLst/>
-          <a:defRPr b="0" baseline="0" cap="none" i="0" spc="0" strike="noStrike" sz="1800" u="none" kumimoji="0" normalizeH="0">
+          <a:defRPr kumimoji="0" sz="1800" b="0" i="0" u="none" strike="noStrike" cap="none" spc="0" normalizeH="0" baseline="0">
             <a:ln>
               <a:noFill/>
             </a:ln>
@@ -4045,7 +4208,7 @@
           <a:buFontTx/>
           <a:buNone/>
           <a:tabLst/>
-          <a:defRPr b="0" baseline="0" cap="none" i="0" spc="0" strike="noStrike" sz="1800" u="none" kumimoji="0" normalizeH="0">
+          <a:defRPr kumimoji="0" sz="1800" b="0" i="0" u="none" strike="noStrike" cap="none" spc="0" normalizeH="0" baseline="0">
             <a:ln>
               <a:noFill/>
             </a:ln>
@@ -4058,9 +4221,15 @@
         </a:lvl9pPr>
       </a:lstStyle>
       <a:style>
-        <a:lnRef idx="0"/>
-        <a:fillRef idx="0"/>
-        <a:effectRef idx="0"/>
+        <a:lnRef idx="0">
+          <a:scrgbClr r="0" g="0" b="0"/>
+        </a:lnRef>
+        <a:fillRef idx="0">
+          <a:scrgbClr r="0" g="0" b="0"/>
+        </a:fillRef>
+        <a:effectRef idx="0">
+          <a:scrgbClr r="0" g="0" b="0"/>
+        </a:effectRef>
         <a:fontRef idx="none"/>
       </a:style>
     </a:spDef>
@@ -4077,7 +4246,7 @@
         <a:effectLst/>
         <a:sp3d/>
       </a:spPr>
-      <a:bodyPr rot="0" spcFirstLastPara="1" vertOverflow="overflow" horzOverflow="overflow" vert="horz" wrap="square" lIns="91439" tIns="45719" rIns="91439" bIns="45719" numCol="1" spcCol="38100" rtlCol="0" anchor="t" upright="0">
+      <a:bodyPr rot="0" spcFirstLastPara="1" vertOverflow="overflow" horzOverflow="overflow" vert="horz" wrap="square" lIns="91439" tIns="45719" rIns="91439" bIns="45719" numCol="1" spcCol="38100" rtlCol="0" anchor="t">
         <a:noAutofit/>
       </a:bodyPr>
       <a:lstStyle>
@@ -4096,7 +4265,7 @@
           <a:buFontTx/>
           <a:buNone/>
           <a:tabLst/>
-          <a:defRPr b="0" baseline="0" cap="none" i="0" spc="0" strike="noStrike" sz="1800" u="none" kumimoji="0" normalizeH="0">
+          <a:defRPr kumimoji="0" sz="1800" b="0" i="0" u="none" strike="noStrike" cap="none" spc="0" normalizeH="0" baseline="0">
             <a:ln>
               <a:noFill/>
             </a:ln>
@@ -4122,7 +4291,7 @@
           <a:buFontTx/>
           <a:buNone/>
           <a:tabLst/>
-          <a:defRPr b="0" baseline="0" cap="none" i="0" spc="0" strike="noStrike" sz="1800" u="none" kumimoji="0" normalizeH="0">
+          <a:defRPr kumimoji="0" sz="1800" b="0" i="0" u="none" strike="noStrike" cap="none" spc="0" normalizeH="0" baseline="0">
             <a:ln>
               <a:noFill/>
             </a:ln>
@@ -4148,7 +4317,7 @@
           <a:buFontTx/>
           <a:buNone/>
           <a:tabLst/>
-          <a:defRPr b="0" baseline="0" cap="none" i="0" spc="0" strike="noStrike" sz="1800" u="none" kumimoji="0" normalizeH="0">
+          <a:defRPr kumimoji="0" sz="1800" b="0" i="0" u="none" strike="noStrike" cap="none" spc="0" normalizeH="0" baseline="0">
             <a:ln>
               <a:noFill/>
             </a:ln>
@@ -4174,7 +4343,7 @@
           <a:buFontTx/>
           <a:buNone/>
           <a:tabLst/>
-          <a:defRPr b="0" baseline="0" cap="none" i="0" spc="0" strike="noStrike" sz="1800" u="none" kumimoji="0" normalizeH="0">
+          <a:defRPr kumimoji="0" sz="1800" b="0" i="0" u="none" strike="noStrike" cap="none" spc="0" normalizeH="0" baseline="0">
             <a:ln>
               <a:noFill/>
             </a:ln>
@@ -4200,7 +4369,7 @@
           <a:buFontTx/>
           <a:buNone/>
           <a:tabLst/>
-          <a:defRPr b="0" baseline="0" cap="none" i="0" spc="0" strike="noStrike" sz="1800" u="none" kumimoji="0" normalizeH="0">
+          <a:defRPr kumimoji="0" sz="1800" b="0" i="0" u="none" strike="noStrike" cap="none" spc="0" normalizeH="0" baseline="0">
             <a:ln>
               <a:noFill/>
             </a:ln>
@@ -4226,7 +4395,7 @@
           <a:buFontTx/>
           <a:buNone/>
           <a:tabLst/>
-          <a:defRPr b="0" baseline="0" cap="none" i="0" spc="0" strike="noStrike" sz="1800" u="none" kumimoji="0" normalizeH="0">
+          <a:defRPr kumimoji="0" sz="1800" b="0" i="0" u="none" strike="noStrike" cap="none" spc="0" normalizeH="0" baseline="0">
             <a:ln>
               <a:noFill/>
             </a:ln>
@@ -4252,7 +4421,7 @@
           <a:buFontTx/>
           <a:buNone/>
           <a:tabLst/>
-          <a:defRPr b="0" baseline="0" cap="none" i="0" spc="0" strike="noStrike" sz="1800" u="none" kumimoji="0" normalizeH="0">
+          <a:defRPr kumimoji="0" sz="1800" b="0" i="0" u="none" strike="noStrike" cap="none" spc="0" normalizeH="0" baseline="0">
             <a:ln>
               <a:noFill/>
             </a:ln>
@@ -4278,7 +4447,7 @@
           <a:buFontTx/>
           <a:buNone/>
           <a:tabLst/>
-          <a:defRPr b="0" baseline="0" cap="none" i="0" spc="0" strike="noStrike" sz="1800" u="none" kumimoji="0" normalizeH="0">
+          <a:defRPr kumimoji="0" sz="1800" b="0" i="0" u="none" strike="noStrike" cap="none" spc="0" normalizeH="0" baseline="0">
             <a:ln>
               <a:noFill/>
             </a:ln>
@@ -4304,7 +4473,7 @@
           <a:buFontTx/>
           <a:buNone/>
           <a:tabLst/>
-          <a:defRPr b="0" baseline="0" cap="none" i="0" spc="0" strike="noStrike" sz="1800" u="none" kumimoji="0" normalizeH="0">
+          <a:defRPr kumimoji="0" sz="1800" b="0" i="0" u="none" strike="noStrike" cap="none" spc="0" normalizeH="0" baseline="0">
             <a:ln>
               <a:noFill/>
             </a:ln>
@@ -4330,7 +4499,7 @@
           <a:buFontTx/>
           <a:buNone/>
           <a:tabLst/>
-          <a:defRPr b="0" baseline="0" cap="none" i="0" spc="0" strike="noStrike" sz="1800" u="none" kumimoji="0" normalizeH="0">
+          <a:defRPr kumimoji="0" sz="1800" b="0" i="0" u="none" strike="noStrike" cap="none" spc="0" normalizeH="0" baseline="0">
             <a:ln>
               <a:noFill/>
             </a:ln>
@@ -4343,9 +4512,15 @@
         </a:lvl9pPr>
       </a:lstStyle>
       <a:style>
-        <a:lnRef idx="0"/>
-        <a:fillRef idx="0"/>
-        <a:effectRef idx="0"/>
+        <a:lnRef idx="0">
+          <a:scrgbClr r="0" g="0" b="0"/>
+        </a:lnRef>
+        <a:fillRef idx="0">
+          <a:scrgbClr r="0" g="0" b="0"/>
+        </a:fillRef>
+        <a:effectRef idx="0">
+          <a:scrgbClr r="0" g="0" b="0"/>
+        </a:effectRef>
         <a:fontRef idx="none"/>
       </a:style>
     </a:lnDef>
@@ -4359,7 +4534,7 @@
         <a:effectLst/>
         <a:sp3d/>
       </a:spPr>
-      <a:bodyPr rot="0" spcFirstLastPara="1" vertOverflow="overflow" horzOverflow="overflow" vert="horz" wrap="square" lIns="50800" tIns="50800" rIns="50800" bIns="50800" numCol="1" spcCol="38100" rtlCol="0" anchor="ctr" upright="0">
+      <a:bodyPr rot="0" spcFirstLastPara="1" vertOverflow="overflow" horzOverflow="overflow" vert="horz" wrap="square" lIns="50800" tIns="50800" rIns="50800" bIns="50800" numCol="1" spcCol="38100" rtlCol="0" anchor="ctr">
         <a:spAutoFit/>
       </a:bodyPr>
       <a:lstStyle>
@@ -4378,7 +4553,7 @@
           <a:buFontTx/>
           <a:buNone/>
           <a:tabLst/>
-          <a:defRPr b="0" baseline="0" cap="none" i="0" spc="0" strike="noStrike" sz="3600" u="none" kumimoji="0" normalizeH="0">
+          <a:defRPr kumimoji="0" sz="3600" b="0" i="0" u="none" strike="noStrike" cap="none" spc="0" normalizeH="0" baseline="0">
             <a:ln>
               <a:noFill/>
             </a:ln>
@@ -4408,7 +4583,7 @@
           <a:buFontTx/>
           <a:buNone/>
           <a:tabLst/>
-          <a:defRPr b="0" baseline="0" cap="none" i="0" spc="0" strike="noStrike" sz="1800" u="none" kumimoji="0" normalizeH="0">
+          <a:defRPr kumimoji="0" sz="1800" b="0" i="0" u="none" strike="noStrike" cap="none" spc="0" normalizeH="0" baseline="0">
             <a:ln>
               <a:noFill/>
             </a:ln>
@@ -4434,7 +4609,7 @@
           <a:buFontTx/>
           <a:buNone/>
           <a:tabLst/>
-          <a:defRPr b="0" baseline="0" cap="none" i="0" spc="0" strike="noStrike" sz="1800" u="none" kumimoji="0" normalizeH="0">
+          <a:defRPr kumimoji="0" sz="1800" b="0" i="0" u="none" strike="noStrike" cap="none" spc="0" normalizeH="0" baseline="0">
             <a:ln>
               <a:noFill/>
             </a:ln>
@@ -4460,7 +4635,7 @@
           <a:buFontTx/>
           <a:buNone/>
           <a:tabLst/>
-          <a:defRPr b="0" baseline="0" cap="none" i="0" spc="0" strike="noStrike" sz="1800" u="none" kumimoji="0" normalizeH="0">
+          <a:defRPr kumimoji="0" sz="1800" b="0" i="0" u="none" strike="noStrike" cap="none" spc="0" normalizeH="0" baseline="0">
             <a:ln>
               <a:noFill/>
             </a:ln>
@@ -4486,7 +4661,7 @@
           <a:buFontTx/>
           <a:buNone/>
           <a:tabLst/>
-          <a:defRPr b="0" baseline="0" cap="none" i="0" spc="0" strike="noStrike" sz="1800" u="none" kumimoji="0" normalizeH="0">
+          <a:defRPr kumimoji="0" sz="1800" b="0" i="0" u="none" strike="noStrike" cap="none" spc="0" normalizeH="0" baseline="0">
             <a:ln>
               <a:noFill/>
             </a:ln>
@@ -4512,7 +4687,7 @@
           <a:buFontTx/>
           <a:buNone/>
           <a:tabLst/>
-          <a:defRPr b="0" baseline="0" cap="none" i="0" spc="0" strike="noStrike" sz="1800" u="none" kumimoji="0" normalizeH="0">
+          <a:defRPr kumimoji="0" sz="1800" b="0" i="0" u="none" strike="noStrike" cap="none" spc="0" normalizeH="0" baseline="0">
             <a:ln>
               <a:noFill/>
             </a:ln>
@@ -4538,7 +4713,7 @@
           <a:buFontTx/>
           <a:buNone/>
           <a:tabLst/>
-          <a:defRPr b="0" baseline="0" cap="none" i="0" spc="0" strike="noStrike" sz="1800" u="none" kumimoji="0" normalizeH="0">
+          <a:defRPr kumimoji="0" sz="1800" b="0" i="0" u="none" strike="noStrike" cap="none" spc="0" normalizeH="0" baseline="0">
             <a:ln>
               <a:noFill/>
             </a:ln>
@@ -4564,7 +4739,7 @@
           <a:buFontTx/>
           <a:buNone/>
           <a:tabLst/>
-          <a:defRPr b="0" baseline="0" cap="none" i="0" spc="0" strike="noStrike" sz="1800" u="none" kumimoji="0" normalizeH="0">
+          <a:defRPr kumimoji="0" sz="1800" b="0" i="0" u="none" strike="noStrike" cap="none" spc="0" normalizeH="0" baseline="0">
             <a:ln>
               <a:noFill/>
             </a:ln>
@@ -4590,7 +4765,7 @@
           <a:buFontTx/>
           <a:buNone/>
           <a:tabLst/>
-          <a:defRPr b="0" baseline="0" cap="none" i="0" spc="0" strike="noStrike" sz="1800" u="none" kumimoji="0" normalizeH="0">
+          <a:defRPr kumimoji="0" sz="1800" b="0" i="0" u="none" strike="noStrike" cap="none" spc="0" normalizeH="0" baseline="0">
             <a:ln>
               <a:noFill/>
             </a:ln>
@@ -4616,7 +4791,7 @@
           <a:buFontTx/>
           <a:buNone/>
           <a:tabLst/>
-          <a:defRPr b="0" baseline="0" cap="none" i="0" spc="0" strike="noStrike" sz="1800" u="none" kumimoji="0" normalizeH="0">
+          <a:defRPr kumimoji="0" sz="1800" b="0" i="0" u="none" strike="noStrike" cap="none" spc="0" normalizeH="0" baseline="0">
             <a:ln>
               <a:noFill/>
             </a:ln>
@@ -4629,18 +4804,25 @@
         </a:lvl9pPr>
       </a:lstStyle>
       <a:style>
-        <a:lnRef idx="0"/>
-        <a:fillRef idx="0"/>
-        <a:effectRef idx="0"/>
+        <a:lnRef idx="0">
+          <a:scrgbClr r="0" g="0" b="0"/>
+        </a:lnRef>
+        <a:fillRef idx="0">
+          <a:scrgbClr r="0" g="0" b="0"/>
+        </a:fillRef>
+        <a:effectRef idx="0">
+          <a:scrgbClr r="0" g="0" b="0"/>
+        </a:effectRef>
         <a:fontRef idx="none"/>
       </a:style>
     </a:txDef>
   </a:objectDefaults>
+  <a:extraClrSchemeLst/>
 </a:theme>
 </file>
 
 <file path=ppt/theme/theme2.xml><?xml version="1.0" encoding="utf-8"?>
-<a:theme xmlns:a="http://schemas.openxmlformats.org/drawingml/2006/main" xmlns:r="http://schemas.openxmlformats.org/officeDocument/2006/relationships" name="White">
+<a:theme xmlns:a="http://schemas.openxmlformats.org/drawingml/2006/main" name="White">
   <a:themeElements>
     <a:clrScheme name="White">
       <a:dk1>
@@ -4766,7 +4948,7 @@
       <a:effectStyleLst>
         <a:effectStyle>
           <a:effectLst>
-            <a:outerShdw sx="100000" sy="100000" kx="0" ky="0" algn="b" rotWithShape="0" blurRad="38100" dist="25400" dir="5400000">
+            <a:outerShdw blurRad="38100" dist="25400" dir="5400000" rotWithShape="0">
               <a:srgbClr val="000000">
                 <a:alpha val="50000"/>
               </a:srgbClr>
@@ -4775,7 +4957,7 @@
         </a:effectStyle>
         <a:effectStyle>
           <a:effectLst>
-            <a:outerShdw sx="100000" sy="100000" kx="0" ky="0" algn="b" rotWithShape="0" blurRad="50800" dist="12700" dir="0">
+            <a:outerShdw blurRad="50800" dist="12700" rotWithShape="0">
               <a:srgbClr val="000000">
                 <a:alpha val="50000"/>
               </a:srgbClr>
@@ -4784,7 +4966,7 @@
         </a:effectStyle>
         <a:effectStyle>
           <a:effectLst>
-            <a:outerShdw sx="100000" sy="100000" kx="0" ky="0" algn="b" rotWithShape="0" blurRad="38100" dist="25400" dir="5400000">
+            <a:outerShdw blurRad="38100" dist="25400" dir="5400000" rotWithShape="0">
               <a:srgbClr val="000000">
                 <a:alpha val="50000"/>
               </a:srgbClr>
@@ -4848,8 +5030,8 @@
     <a:spDef>
       <a:spPr>
         <a:blipFill rotWithShape="1">
-          <a:blip r:embed="rId1"/>
-          <a:srcRect l="0" t="0" r="0" b="0"/>
+          <a:blip xmlns:r="http://schemas.openxmlformats.org/officeDocument/2006/relationships" r:embed="rId1"/>
+          <a:srcRect/>
           <a:tile tx="0" ty="0" sx="100000" sy="100000" flip="none" algn="tl"/>
         </a:blipFill>
         <a:ln w="12700" cap="flat">
@@ -4857,7 +5039,7 @@
           <a:miter lim="400000"/>
         </a:ln>
         <a:effectLst>
-          <a:outerShdw sx="100000" sy="100000" kx="0" ky="0" algn="b" rotWithShape="0" blurRad="38100" dist="25400" dir="5400000">
+          <a:outerShdw blurRad="38100" dist="25400" dir="5400000" rotWithShape="0">
             <a:srgbClr val="000000">
               <a:alpha val="50000"/>
             </a:srgbClr>
@@ -4865,7 +5047,7 @@
         </a:effectLst>
         <a:sp3d/>
       </a:spPr>
-      <a:bodyPr rot="0" spcFirstLastPara="1" vertOverflow="overflow" horzOverflow="overflow" vert="horz" wrap="square" lIns="50800" tIns="50800" rIns="50800" bIns="50800" numCol="1" spcCol="38100" rtlCol="0" anchor="ctr" upright="0">
+      <a:bodyPr rot="0" spcFirstLastPara="1" vertOverflow="overflow" horzOverflow="overflow" vert="horz" wrap="square" lIns="50800" tIns="50800" rIns="50800" bIns="50800" numCol="1" spcCol="38100" rtlCol="0" anchor="ctr">
         <a:spAutoFit/>
       </a:bodyPr>
       <a:lstStyle>
@@ -4884,7 +5066,7 @@
           <a:buFontTx/>
           <a:buNone/>
           <a:tabLst/>
-          <a:defRPr b="0" baseline="0" cap="none" i="0" spc="0" strike="noStrike" sz="2400" u="none" kumimoji="0" normalizeH="0">
+          <a:defRPr kumimoji="0" sz="2400" b="0" i="0" u="none" strike="noStrike" cap="none" spc="0" normalizeH="0" baseline="0">
             <a:ln>
               <a:noFill/>
             </a:ln>
@@ -4914,7 +5096,7 @@
           <a:buFontTx/>
           <a:buNone/>
           <a:tabLst/>
-          <a:defRPr b="0" baseline="0" cap="none" i="0" spc="0" strike="noStrike" sz="1800" u="none" kumimoji="0" normalizeH="0">
+          <a:defRPr kumimoji="0" sz="1800" b="0" i="0" u="none" strike="noStrike" cap="none" spc="0" normalizeH="0" baseline="0">
             <a:ln>
               <a:noFill/>
             </a:ln>
@@ -4940,7 +5122,7 @@
           <a:buFontTx/>
           <a:buNone/>
           <a:tabLst/>
-          <a:defRPr b="0" baseline="0" cap="none" i="0" spc="0" strike="noStrike" sz="1800" u="none" kumimoji="0" normalizeH="0">
+          <a:defRPr kumimoji="0" sz="1800" b="0" i="0" u="none" strike="noStrike" cap="none" spc="0" normalizeH="0" baseline="0">
             <a:ln>
               <a:noFill/>
             </a:ln>
@@ -4966,7 +5148,7 @@
           <a:buFontTx/>
           <a:buNone/>
           <a:tabLst/>
-          <a:defRPr b="0" baseline="0" cap="none" i="0" spc="0" strike="noStrike" sz="1800" u="none" kumimoji="0" normalizeH="0">
+          <a:defRPr kumimoji="0" sz="1800" b="0" i="0" u="none" strike="noStrike" cap="none" spc="0" normalizeH="0" baseline="0">
             <a:ln>
               <a:noFill/>
             </a:ln>
@@ -4992,7 +5174,7 @@
           <a:buFontTx/>
           <a:buNone/>
           <a:tabLst/>
-          <a:defRPr b="0" baseline="0" cap="none" i="0" spc="0" strike="noStrike" sz="1800" u="none" kumimoji="0" normalizeH="0">
+          <a:defRPr kumimoji="0" sz="1800" b="0" i="0" u="none" strike="noStrike" cap="none" spc="0" normalizeH="0" baseline="0">
             <a:ln>
               <a:noFill/>
             </a:ln>
@@ -5018,7 +5200,7 @@
           <a:buFontTx/>
           <a:buNone/>
           <a:tabLst/>
-          <a:defRPr b="0" baseline="0" cap="none" i="0" spc="0" strike="noStrike" sz="1800" u="none" kumimoji="0" normalizeH="0">
+          <a:defRPr kumimoji="0" sz="1800" b="0" i="0" u="none" strike="noStrike" cap="none" spc="0" normalizeH="0" baseline="0">
             <a:ln>
               <a:noFill/>
             </a:ln>
@@ -5044,7 +5226,7 @@
           <a:buFontTx/>
           <a:buNone/>
           <a:tabLst/>
-          <a:defRPr b="0" baseline="0" cap="none" i="0" spc="0" strike="noStrike" sz="1800" u="none" kumimoji="0" normalizeH="0">
+          <a:defRPr kumimoji="0" sz="1800" b="0" i="0" u="none" strike="noStrike" cap="none" spc="0" normalizeH="0" baseline="0">
             <a:ln>
               <a:noFill/>
             </a:ln>
@@ -5070,7 +5252,7 @@
           <a:buFontTx/>
           <a:buNone/>
           <a:tabLst/>
-          <a:defRPr b="0" baseline="0" cap="none" i="0" spc="0" strike="noStrike" sz="1800" u="none" kumimoji="0" normalizeH="0">
+          <a:defRPr kumimoji="0" sz="1800" b="0" i="0" u="none" strike="noStrike" cap="none" spc="0" normalizeH="0" baseline="0">
             <a:ln>
               <a:noFill/>
             </a:ln>
@@ -5096,7 +5278,7 @@
           <a:buFontTx/>
           <a:buNone/>
           <a:tabLst/>
-          <a:defRPr b="0" baseline="0" cap="none" i="0" spc="0" strike="noStrike" sz="1800" u="none" kumimoji="0" normalizeH="0">
+          <a:defRPr kumimoji="0" sz="1800" b="0" i="0" u="none" strike="noStrike" cap="none" spc="0" normalizeH="0" baseline="0">
             <a:ln>
               <a:noFill/>
             </a:ln>
@@ -5122,7 +5304,7 @@
           <a:buFontTx/>
           <a:buNone/>
           <a:tabLst/>
-          <a:defRPr b="0" baseline="0" cap="none" i="0" spc="0" strike="noStrike" sz="1800" u="none" kumimoji="0" normalizeH="0">
+          <a:defRPr kumimoji="0" sz="1800" b="0" i="0" u="none" strike="noStrike" cap="none" spc="0" normalizeH="0" baseline="0">
             <a:ln>
               <a:noFill/>
             </a:ln>
@@ -5135,9 +5317,15 @@
         </a:lvl9pPr>
       </a:lstStyle>
       <a:style>
-        <a:lnRef idx="0"/>
-        <a:fillRef idx="0"/>
-        <a:effectRef idx="0"/>
+        <a:lnRef idx="0">
+          <a:scrgbClr r="0" g="0" b="0"/>
+        </a:lnRef>
+        <a:fillRef idx="0">
+          <a:scrgbClr r="0" g="0" b="0"/>
+        </a:fillRef>
+        <a:effectRef idx="0">
+          <a:scrgbClr r="0" g="0" b="0"/>
+        </a:effectRef>
         <a:fontRef idx="none"/>
       </a:style>
     </a:spDef>
@@ -5154,7 +5342,7 @@
         <a:effectLst/>
         <a:sp3d/>
       </a:spPr>
-      <a:bodyPr rot="0" spcFirstLastPara="1" vertOverflow="overflow" horzOverflow="overflow" vert="horz" wrap="square" lIns="91439" tIns="45719" rIns="91439" bIns="45719" numCol="1" spcCol="38100" rtlCol="0" anchor="t" upright="0">
+      <a:bodyPr rot="0" spcFirstLastPara="1" vertOverflow="overflow" horzOverflow="overflow" vert="horz" wrap="square" lIns="91439" tIns="45719" rIns="91439" bIns="45719" numCol="1" spcCol="38100" rtlCol="0" anchor="t">
         <a:noAutofit/>
       </a:bodyPr>
       <a:lstStyle>
@@ -5173,7 +5361,7 @@
           <a:buFontTx/>
           <a:buNone/>
           <a:tabLst/>
-          <a:defRPr b="0" baseline="0" cap="none" i="0" spc="0" strike="noStrike" sz="1800" u="none" kumimoji="0" normalizeH="0">
+          <a:defRPr kumimoji="0" sz="1800" b="0" i="0" u="none" strike="noStrike" cap="none" spc="0" normalizeH="0" baseline="0">
             <a:ln>
               <a:noFill/>
             </a:ln>
@@ -5199,7 +5387,7 @@
           <a:buFontTx/>
           <a:buNone/>
           <a:tabLst/>
-          <a:defRPr b="0" baseline="0" cap="none" i="0" spc="0" strike="noStrike" sz="1800" u="none" kumimoji="0" normalizeH="0">
+          <a:defRPr kumimoji="0" sz="1800" b="0" i="0" u="none" strike="noStrike" cap="none" spc="0" normalizeH="0" baseline="0">
             <a:ln>
               <a:noFill/>
             </a:ln>
@@ -5225,7 +5413,7 @@
           <a:buFontTx/>
           <a:buNone/>
           <a:tabLst/>
-          <a:defRPr b="0" baseline="0" cap="none" i="0" spc="0" strike="noStrike" sz="1800" u="none" kumimoji="0" normalizeH="0">
+          <a:defRPr kumimoji="0" sz="1800" b="0" i="0" u="none" strike="noStrike" cap="none" spc="0" normalizeH="0" baseline="0">
             <a:ln>
               <a:noFill/>
             </a:ln>
@@ -5251,7 +5439,7 @@
           <a:buFontTx/>
           <a:buNone/>
           <a:tabLst/>
-          <a:defRPr b="0" baseline="0" cap="none" i="0" spc="0" strike="noStrike" sz="1800" u="none" kumimoji="0" normalizeH="0">
+          <a:defRPr kumimoji="0" sz="1800" b="0" i="0" u="none" strike="noStrike" cap="none" spc="0" normalizeH="0" baseline="0">
             <a:ln>
               <a:noFill/>
             </a:ln>
@@ -5277,7 +5465,7 @@
           <a:buFontTx/>
           <a:buNone/>
           <a:tabLst/>
-          <a:defRPr b="0" baseline="0" cap="none" i="0" spc="0" strike="noStrike" sz="1800" u="none" kumimoji="0" normalizeH="0">
+          <a:defRPr kumimoji="0" sz="1800" b="0" i="0" u="none" strike="noStrike" cap="none" spc="0" normalizeH="0" baseline="0">
             <a:ln>
               <a:noFill/>
             </a:ln>
@@ -5303,7 +5491,7 @@
           <a:buFontTx/>
           <a:buNone/>
           <a:tabLst/>
-          <a:defRPr b="0" baseline="0" cap="none" i="0" spc="0" strike="noStrike" sz="1800" u="none" kumimoji="0" normalizeH="0">
+          <a:defRPr kumimoji="0" sz="1800" b="0" i="0" u="none" strike="noStrike" cap="none" spc="0" normalizeH="0" baseline="0">
             <a:ln>
               <a:noFill/>
             </a:ln>
@@ -5329,7 +5517,7 @@
           <a:buFontTx/>
           <a:buNone/>
           <a:tabLst/>
-          <a:defRPr b="0" baseline="0" cap="none" i="0" spc="0" strike="noStrike" sz="1800" u="none" kumimoji="0" normalizeH="0">
+          <a:defRPr kumimoji="0" sz="1800" b="0" i="0" u="none" strike="noStrike" cap="none" spc="0" normalizeH="0" baseline="0">
             <a:ln>
               <a:noFill/>
             </a:ln>
@@ -5355,7 +5543,7 @@
           <a:buFontTx/>
           <a:buNone/>
           <a:tabLst/>
-          <a:defRPr b="0" baseline="0" cap="none" i="0" spc="0" strike="noStrike" sz="1800" u="none" kumimoji="0" normalizeH="0">
+          <a:defRPr kumimoji="0" sz="1800" b="0" i="0" u="none" strike="noStrike" cap="none" spc="0" normalizeH="0" baseline="0">
             <a:ln>
               <a:noFill/>
             </a:ln>
@@ -5381,7 +5569,7 @@
           <a:buFontTx/>
           <a:buNone/>
           <a:tabLst/>
-          <a:defRPr b="0" baseline="0" cap="none" i="0" spc="0" strike="noStrike" sz="1800" u="none" kumimoji="0" normalizeH="0">
+          <a:defRPr kumimoji="0" sz="1800" b="0" i="0" u="none" strike="noStrike" cap="none" spc="0" normalizeH="0" baseline="0">
             <a:ln>
               <a:noFill/>
             </a:ln>
@@ -5407,7 +5595,7 @@
           <a:buFontTx/>
           <a:buNone/>
           <a:tabLst/>
-          <a:defRPr b="0" baseline="0" cap="none" i="0" spc="0" strike="noStrike" sz="1800" u="none" kumimoji="0" normalizeH="0">
+          <a:defRPr kumimoji="0" sz="1800" b="0" i="0" u="none" strike="noStrike" cap="none" spc="0" normalizeH="0" baseline="0">
             <a:ln>
               <a:noFill/>
             </a:ln>
@@ -5420,9 +5608,15 @@
         </a:lvl9pPr>
       </a:lstStyle>
       <a:style>
-        <a:lnRef idx="0"/>
-        <a:fillRef idx="0"/>
-        <a:effectRef idx="0"/>
+        <a:lnRef idx="0">
+          <a:scrgbClr r="0" g="0" b="0"/>
+        </a:lnRef>
+        <a:fillRef idx="0">
+          <a:scrgbClr r="0" g="0" b="0"/>
+        </a:fillRef>
+        <a:effectRef idx="0">
+          <a:scrgbClr r="0" g="0" b="0"/>
+        </a:effectRef>
         <a:fontRef idx="none"/>
       </a:style>
     </a:lnDef>
@@ -5436,7 +5630,7 @@
         <a:effectLst/>
         <a:sp3d/>
       </a:spPr>
-      <a:bodyPr rot="0" spcFirstLastPara="1" vertOverflow="overflow" horzOverflow="overflow" vert="horz" wrap="square" lIns="50800" tIns="50800" rIns="50800" bIns="50800" numCol="1" spcCol="38100" rtlCol="0" anchor="ctr" upright="0">
+      <a:bodyPr rot="0" spcFirstLastPara="1" vertOverflow="overflow" horzOverflow="overflow" vert="horz" wrap="square" lIns="50800" tIns="50800" rIns="50800" bIns="50800" numCol="1" spcCol="38100" rtlCol="0" anchor="ctr">
         <a:spAutoFit/>
       </a:bodyPr>
       <a:lstStyle>
@@ -5455,7 +5649,7 @@
           <a:buFontTx/>
           <a:buNone/>
           <a:tabLst/>
-          <a:defRPr b="0" baseline="0" cap="none" i="0" spc="0" strike="noStrike" sz="3600" u="none" kumimoji="0" normalizeH="0">
+          <a:defRPr kumimoji="0" sz="3600" b="0" i="0" u="none" strike="noStrike" cap="none" spc="0" normalizeH="0" baseline="0">
             <a:ln>
               <a:noFill/>
             </a:ln>
@@ -5485,7 +5679,7 @@
           <a:buFontTx/>
           <a:buNone/>
           <a:tabLst/>
-          <a:defRPr b="0" baseline="0" cap="none" i="0" spc="0" strike="noStrike" sz="1800" u="none" kumimoji="0" normalizeH="0">
+          <a:defRPr kumimoji="0" sz="1800" b="0" i="0" u="none" strike="noStrike" cap="none" spc="0" normalizeH="0" baseline="0">
             <a:ln>
               <a:noFill/>
             </a:ln>
@@ -5511,7 +5705,7 @@
           <a:buFontTx/>
           <a:buNone/>
           <a:tabLst/>
-          <a:defRPr b="0" baseline="0" cap="none" i="0" spc="0" strike="noStrike" sz="1800" u="none" kumimoji="0" normalizeH="0">
+          <a:defRPr kumimoji="0" sz="1800" b="0" i="0" u="none" strike="noStrike" cap="none" spc="0" normalizeH="0" baseline="0">
             <a:ln>
               <a:noFill/>
             </a:ln>
@@ -5537,7 +5731,7 @@
           <a:buFontTx/>
           <a:buNone/>
           <a:tabLst/>
-          <a:defRPr b="0" baseline="0" cap="none" i="0" spc="0" strike="noStrike" sz="1800" u="none" kumimoji="0" normalizeH="0">
+          <a:defRPr kumimoji="0" sz="1800" b="0" i="0" u="none" strike="noStrike" cap="none" spc="0" normalizeH="0" baseline="0">
             <a:ln>
               <a:noFill/>
             </a:ln>
@@ -5563,7 +5757,7 @@
           <a:buFontTx/>
           <a:buNone/>
           <a:tabLst/>
-          <a:defRPr b="0" baseline="0" cap="none" i="0" spc="0" strike="noStrike" sz="1800" u="none" kumimoji="0" normalizeH="0">
+          <a:defRPr kumimoji="0" sz="1800" b="0" i="0" u="none" strike="noStrike" cap="none" spc="0" normalizeH="0" baseline="0">
             <a:ln>
               <a:noFill/>
             </a:ln>
@@ -5589,7 +5783,7 @@
           <a:buFontTx/>
           <a:buNone/>
           <a:tabLst/>
-          <a:defRPr b="0" baseline="0" cap="none" i="0" spc="0" strike="noStrike" sz="1800" u="none" kumimoji="0" normalizeH="0">
+          <a:defRPr kumimoji="0" sz="1800" b="0" i="0" u="none" strike="noStrike" cap="none" spc="0" normalizeH="0" baseline="0">
             <a:ln>
               <a:noFill/>
             </a:ln>
@@ -5615,7 +5809,7 @@
           <a:buFontTx/>
           <a:buNone/>
           <a:tabLst/>
-          <a:defRPr b="0" baseline="0" cap="none" i="0" spc="0" strike="noStrike" sz="1800" u="none" kumimoji="0" normalizeH="0">
+          <a:defRPr kumimoji="0" sz="1800" b="0" i="0" u="none" strike="noStrike" cap="none" spc="0" normalizeH="0" baseline="0">
             <a:ln>
               <a:noFill/>
             </a:ln>
@@ -5641,7 +5835,7 @@
           <a:buFontTx/>
           <a:buNone/>
           <a:tabLst/>
-          <a:defRPr b="0" baseline="0" cap="none" i="0" spc="0" strike="noStrike" sz="1800" u="none" kumimoji="0" normalizeH="0">
+          <a:defRPr kumimoji="0" sz="1800" b="0" i="0" u="none" strike="noStrike" cap="none" spc="0" normalizeH="0" baseline="0">
             <a:ln>
               <a:noFill/>
             </a:ln>
@@ -5667,7 +5861,7 @@
           <a:buFontTx/>
           <a:buNone/>
           <a:tabLst/>
-          <a:defRPr b="0" baseline="0" cap="none" i="0" spc="0" strike="noStrike" sz="1800" u="none" kumimoji="0" normalizeH="0">
+          <a:defRPr kumimoji="0" sz="1800" b="0" i="0" u="none" strike="noStrike" cap="none" spc="0" normalizeH="0" baseline="0">
             <a:ln>
               <a:noFill/>
             </a:ln>
@@ -5693,7 +5887,7 @@
           <a:buFontTx/>
           <a:buNone/>
           <a:tabLst/>
-          <a:defRPr b="0" baseline="0" cap="none" i="0" spc="0" strike="noStrike" sz="1800" u="none" kumimoji="0" normalizeH="0">
+          <a:defRPr kumimoji="0" sz="1800" b="0" i="0" u="none" strike="noStrike" cap="none" spc="0" normalizeH="0" baseline="0">
             <a:ln>
               <a:noFill/>
             </a:ln>
@@ -5706,12 +5900,19 @@
         </a:lvl9pPr>
       </a:lstStyle>
       <a:style>
-        <a:lnRef idx="0"/>
-        <a:fillRef idx="0"/>
-        <a:effectRef idx="0"/>
+        <a:lnRef idx="0">
+          <a:scrgbClr r="0" g="0" b="0"/>
+        </a:lnRef>
+        <a:fillRef idx="0">
+          <a:scrgbClr r="0" g="0" b="0"/>
+        </a:fillRef>
+        <a:effectRef idx="0">
+          <a:scrgbClr r="0" g="0" b="0"/>
+        </a:effectRef>
         <a:fontRef idx="none"/>
       </a:style>
     </a:txDef>
   </a:objectDefaults>
+  <a:extraClrSchemeLst/>
 </a:theme>
 </file>
</xml_diff>